<commit_message>
I take lesson notes
</commit_message>
<xml_diff>
--- a/Quarto and MD 3/3. Presentation formats/QMD_class_3_3.pptx
+++ b/Quarto and MD 3/3. Presentation formats/QMD_class_3_3.pptx
@@ -1,8 +1,8 @@
 
 <file path=ppt/presentation.xml><?xml version="1.0" encoding="utf-8"?>
-<p:presentation xmlns:a="http://schemas.openxmlformats.org/drawingml/2006/main" xmlns:p="http://schemas.openxmlformats.org/presentationml/2006/main" xmlns:r="http://schemas.openxmlformats.org/officeDocument/2006/relationships" autoCompressPictures="0" saveSubsetFonts="1">
+<p:presentation xmlns:a="http://schemas.openxmlformats.org/drawingml/2006/main" xmlns:r="http://schemas.openxmlformats.org/officeDocument/2006/relationships" xmlns:p="http://schemas.openxmlformats.org/presentationml/2006/main" saveSubsetFonts="1" autoCompressPictures="0">
   <p:sldMasterIdLst>
-    <p:sldMasterId id="2147483648" r:id="rId1"/>
+    <p:sldMasterId id="2147483660" r:id="rId1"/>
   </p:sldMasterIdLst>
   <p:notesMasterIdLst>
     <p:notesMasterId r:id="rId14"/>
@@ -27,8 +27,8 @@
     <a:defPPr>
       <a:defRPr lang="en-US"/>
     </a:defPPr>
-    <a:lvl1pPr algn="l" defTabSz="457200" eaLnBrk="1" hangingPunct="1" latinLnBrk="0" marL="0" rtl="0">
-      <a:defRPr kern="1200" sz="1800">
+    <a:lvl1pPr marL="0" algn="l" defTabSz="457200" rtl="0" eaLnBrk="1" latinLnBrk="0" hangingPunct="1">
+      <a:defRPr sz="1800" kern="1200">
         <a:solidFill>
           <a:schemeClr val="tx1"/>
         </a:solidFill>
@@ -37,8 +37,8 @@
         <a:cs typeface="+mn-cs"/>
       </a:defRPr>
     </a:lvl1pPr>
-    <a:lvl2pPr algn="l" defTabSz="457200" eaLnBrk="1" hangingPunct="1" latinLnBrk="0" marL="457200" rtl="0">
-      <a:defRPr kern="1200" sz="1800">
+    <a:lvl2pPr marL="457200" algn="l" defTabSz="457200" rtl="0" eaLnBrk="1" latinLnBrk="0" hangingPunct="1">
+      <a:defRPr sz="1800" kern="1200">
         <a:solidFill>
           <a:schemeClr val="tx1"/>
         </a:solidFill>
@@ -47,8 +47,8 @@
         <a:cs typeface="+mn-cs"/>
       </a:defRPr>
     </a:lvl2pPr>
-    <a:lvl3pPr algn="l" defTabSz="457200" eaLnBrk="1" hangingPunct="1" latinLnBrk="0" marL="914400" rtl="0">
-      <a:defRPr kern="1200" sz="1800">
+    <a:lvl3pPr marL="914400" algn="l" defTabSz="457200" rtl="0" eaLnBrk="1" latinLnBrk="0" hangingPunct="1">
+      <a:defRPr sz="1800" kern="1200">
         <a:solidFill>
           <a:schemeClr val="tx1"/>
         </a:solidFill>
@@ -57,8 +57,8 @@
         <a:cs typeface="+mn-cs"/>
       </a:defRPr>
     </a:lvl3pPr>
-    <a:lvl4pPr algn="l" defTabSz="457200" eaLnBrk="1" hangingPunct="1" latinLnBrk="0" marL="1371600" rtl="0">
-      <a:defRPr kern="1200" sz="1800">
+    <a:lvl4pPr marL="1371600" algn="l" defTabSz="457200" rtl="0" eaLnBrk="1" latinLnBrk="0" hangingPunct="1">
+      <a:defRPr sz="1800" kern="1200">
         <a:solidFill>
           <a:schemeClr val="tx1"/>
         </a:solidFill>
@@ -67,8 +67,8 @@
         <a:cs typeface="+mn-cs"/>
       </a:defRPr>
     </a:lvl4pPr>
-    <a:lvl5pPr algn="l" defTabSz="457200" eaLnBrk="1" hangingPunct="1" latinLnBrk="0" marL="1828800" rtl="0">
-      <a:defRPr kern="1200" sz="1800">
+    <a:lvl5pPr marL="1828800" algn="l" defTabSz="457200" rtl="0" eaLnBrk="1" latinLnBrk="0" hangingPunct="1">
+      <a:defRPr sz="1800" kern="1200">
         <a:solidFill>
           <a:schemeClr val="tx1"/>
         </a:solidFill>
@@ -77,8 +77,8 @@
         <a:cs typeface="+mn-cs"/>
       </a:defRPr>
     </a:lvl5pPr>
-    <a:lvl6pPr algn="l" defTabSz="457200" eaLnBrk="1" hangingPunct="1" latinLnBrk="0" marL="2286000" rtl="0">
-      <a:defRPr kern="1200" sz="1800">
+    <a:lvl6pPr marL="2286000" algn="l" defTabSz="457200" rtl="0" eaLnBrk="1" latinLnBrk="0" hangingPunct="1">
+      <a:defRPr sz="1800" kern="1200">
         <a:solidFill>
           <a:schemeClr val="tx1"/>
         </a:solidFill>
@@ -87,8 +87,8 @@
         <a:cs typeface="+mn-cs"/>
       </a:defRPr>
     </a:lvl6pPr>
-    <a:lvl7pPr algn="l" defTabSz="457200" eaLnBrk="1" hangingPunct="1" latinLnBrk="0" marL="2743200" rtl="0">
-      <a:defRPr kern="1200" sz="1800">
+    <a:lvl7pPr marL="2743200" algn="l" defTabSz="457200" rtl="0" eaLnBrk="1" latinLnBrk="0" hangingPunct="1">
+      <a:defRPr sz="1800" kern="1200">
         <a:solidFill>
           <a:schemeClr val="tx1"/>
         </a:solidFill>
@@ -97,8 +97,8 @@
         <a:cs typeface="+mn-cs"/>
       </a:defRPr>
     </a:lvl7pPr>
-    <a:lvl8pPr algn="l" defTabSz="457200" eaLnBrk="1" hangingPunct="1" latinLnBrk="0" marL="3200400" rtl="0">
-      <a:defRPr kern="1200" sz="1800">
+    <a:lvl8pPr marL="3200400" algn="l" defTabSz="457200" rtl="0" eaLnBrk="1" latinLnBrk="0" hangingPunct="1">
+      <a:defRPr sz="1800" kern="1200">
         <a:solidFill>
           <a:schemeClr val="tx1"/>
         </a:solidFill>
@@ -107,8 +107,8 @@
         <a:cs typeface="+mn-cs"/>
       </a:defRPr>
     </a:lvl8pPr>
-    <a:lvl9pPr algn="l" defTabSz="457200" eaLnBrk="1" hangingPunct="1" latinLnBrk="0" marL="3657600" rtl="0">
-      <a:defRPr kern="1200" sz="1800">
+    <a:lvl9pPr marL="3657600" algn="l" defTabSz="457200" rtl="0" eaLnBrk="1" latinLnBrk="0" hangingPunct="1">
+      <a:defRPr sz="1800" kern="1200">
         <a:solidFill>
           <a:schemeClr val="tx1"/>
         </a:solidFill>
@@ -219,7 +219,7 @@
           <a:p>
             <a:fld id="{0F9C1CCF-B725-44A7-AA57-5E433BD85C9F}" type="datetimeFigureOut">
               <a:rPr lang="en-US" smtClean="0"/>
-              <a:t>1/2/22</a:t>
+              <a:t>27-Apr-23</a:t>
             </a:fld>
             <a:endParaRPr lang="en-US"/>
           </a:p>
@@ -530,11 +530,10 @@
           <a:bodyPr/>
           <a:lstStyle/>
           <a:p>
-            <a:pPr lvl="0" indent="0" marL="0">
+            <a:pPr marL="0" lvl="0" indent="0">
               <a:buNone/>
             </a:pPr>
             <a:r>
-              <a:rPr/>
               <a:t>These are some hidden notes for the presenter (they can include MD as well)</a:t>
             </a:r>
           </a:p>
@@ -565,12 +564,23 @@
       </p:sp>
     </p:spTree>
   </p:cSld>
+  <p:clrMapOvr>
+    <a:masterClrMapping/>
+  </p:clrMapOvr>
 </p:notes>
 </file>
 
 <file path=ppt/slideLayouts/slideLayout1.xml><?xml version="1.0" encoding="utf-8"?>
 <p:sldLayout xmlns:a="http://schemas.openxmlformats.org/drawingml/2006/main" xmlns:r="http://schemas.openxmlformats.org/officeDocument/2006/relationships" xmlns:p="http://schemas.openxmlformats.org/presentationml/2006/main" type="title" preserve="1">
   <p:cSld name="Title Slide">
+    <p:bg>
+      <p:bgPr>
+        <a:solidFill>
+          <a:schemeClr val="accent2"/>
+        </a:solidFill>
+        <a:effectLst/>
+      </p:bgPr>
+    </p:bg>
     <p:spTree>
       <p:nvGrpSpPr>
         <p:cNvPr id="1" name=""/>
@@ -595,131 +605,106 @@
             <p:ph type="ctrTitle"/>
           </p:nvPr>
         </p:nvSpPr>
+        <p:spPr bwMode="blackWhite">
+          <a:xfrm>
+            <a:off x="1200150" y="1790058"/>
+            <a:ext cx="6743700" cy="1234440"/>
+          </a:xfrm>
+          <a:solidFill>
+            <a:srgbClr val="FFFFFF"/>
+          </a:solidFill>
+          <a:ln w="38100">
+            <a:solidFill>
+              <a:srgbClr val="404040"/>
+            </a:solidFill>
+          </a:ln>
+        </p:spPr>
+        <p:txBody>
+          <a:bodyPr lIns="274320" rIns="274320" anchor="ctr" anchorCtr="1">
+            <a:normAutofit/>
+          </a:bodyPr>
+          <a:lstStyle>
+            <a:lvl1pPr algn="ctr">
+              <a:defRPr sz="2850">
+                <a:solidFill>
+                  <a:srgbClr val="262626"/>
+                </a:solidFill>
+              </a:defRPr>
+            </a:lvl1pPr>
+          </a:lstStyle>
+          <a:p>
+            <a:r>
+              <a:rPr lang="en-US"/>
+              <a:t>Click to edit Master title style</a:t>
+            </a:r>
+            <a:endParaRPr lang="en-US" dirty="0"/>
+          </a:p>
+        </p:txBody>
+      </p:sp>
+      <p:sp>
+        <p:nvSpPr>
+          <p:cNvPr id="3" name="Subtitle 2"/>
+          <p:cNvSpPr>
+            <a:spLocks noGrp="1"/>
+          </p:cNvSpPr>
+          <p:nvPr>
+            <p:ph type="subTitle" idx="1"/>
+          </p:nvPr>
+        </p:nvSpPr>
         <p:spPr>
           <a:xfrm>
-            <a:off x="685800" y="1597819"/>
-            <a:ext cx="7772400" cy="1102519"/>
+            <a:off x="2021396" y="3264408"/>
+            <a:ext cx="5101209" cy="929921"/>
           </a:xfrm>
+          <a:noFill/>
         </p:spPr>
         <p:txBody>
-          <a:bodyPr/>
-          <a:lstStyle/>
-          <a:p>
-            <a:r>
-              <a:rPr lang="en-US"/>
-              <a:t>Click to edit Master title style</a:t>
-            </a:r>
-          </a:p>
-        </p:txBody>
-      </p:sp>
-      <p:sp>
-        <p:nvSpPr>
-          <p:cNvPr id="3" name="Subtitle 2"/>
-          <p:cNvSpPr>
-            <a:spLocks noGrp="1"/>
-          </p:cNvSpPr>
-          <p:nvPr>
-            <p:ph type="subTitle" idx="1"/>
-          </p:nvPr>
-        </p:nvSpPr>
-        <p:spPr>
-          <a:xfrm>
-            <a:off x="1371600" y="2914650"/>
-            <a:ext cx="6400800" cy="1314450"/>
-          </a:xfrm>
-        </p:spPr>
-        <p:txBody>
-          <a:bodyPr/>
+          <a:bodyPr>
+            <a:normAutofit/>
+          </a:bodyPr>
           <a:lstStyle>
             <a:lvl1pPr marL="0" indent="0" algn="ctr">
               <a:buNone/>
-              <a:defRPr>
+              <a:defRPr sz="1500">
                 <a:solidFill>
                   <a:schemeClr val="tx1">
-                    <a:tint val="75000"/>
+                    <a:lumMod val="75000"/>
+                    <a:lumOff val="25000"/>
                   </a:schemeClr>
                 </a:solidFill>
               </a:defRPr>
             </a:lvl1pPr>
             <a:lvl2pPr marL="342900" indent="0" algn="ctr">
               <a:buNone/>
-              <a:defRPr>
-                <a:solidFill>
-                  <a:schemeClr val="tx1">
-                    <a:tint val="75000"/>
-                  </a:schemeClr>
-                </a:solidFill>
-              </a:defRPr>
+              <a:defRPr sz="1500"/>
             </a:lvl2pPr>
             <a:lvl3pPr marL="685800" indent="0" algn="ctr">
               <a:buNone/>
-              <a:defRPr>
-                <a:solidFill>
-                  <a:schemeClr val="tx1">
-                    <a:tint val="75000"/>
-                  </a:schemeClr>
-                </a:solidFill>
-              </a:defRPr>
+              <a:defRPr sz="1350"/>
             </a:lvl3pPr>
             <a:lvl4pPr marL="1028700" indent="0" algn="ctr">
               <a:buNone/>
-              <a:defRPr>
-                <a:solidFill>
-                  <a:schemeClr val="tx1">
-                    <a:tint val="75000"/>
-                  </a:schemeClr>
-                </a:solidFill>
-              </a:defRPr>
+              <a:defRPr sz="1200"/>
             </a:lvl4pPr>
             <a:lvl5pPr marL="1371600" indent="0" algn="ctr">
               <a:buNone/>
-              <a:defRPr>
-                <a:solidFill>
-                  <a:schemeClr val="tx1">
-                    <a:tint val="75000"/>
-                  </a:schemeClr>
-                </a:solidFill>
-              </a:defRPr>
+              <a:defRPr sz="1200"/>
             </a:lvl5pPr>
             <a:lvl6pPr marL="1714500" indent="0" algn="ctr">
               <a:buNone/>
-              <a:defRPr>
-                <a:solidFill>
-                  <a:schemeClr val="tx1">
-                    <a:tint val="75000"/>
-                  </a:schemeClr>
-                </a:solidFill>
-              </a:defRPr>
+              <a:defRPr sz="1200"/>
             </a:lvl6pPr>
             <a:lvl7pPr marL="2057400" indent="0" algn="ctr">
               <a:buNone/>
-              <a:defRPr>
-                <a:solidFill>
-                  <a:schemeClr val="tx1">
-                    <a:tint val="75000"/>
-                  </a:schemeClr>
-                </a:solidFill>
-              </a:defRPr>
+              <a:defRPr sz="1200"/>
             </a:lvl7pPr>
             <a:lvl8pPr marL="2400300" indent="0" algn="ctr">
               <a:buNone/>
-              <a:defRPr>
-                <a:solidFill>
-                  <a:schemeClr val="tx1">
-                    <a:tint val="75000"/>
-                  </a:schemeClr>
-                </a:solidFill>
-              </a:defRPr>
+              <a:defRPr sz="1200"/>
             </a:lvl8pPr>
             <a:lvl9pPr marL="2743200" indent="0" algn="ctr">
               <a:buNone/>
-              <a:defRPr>
-                <a:solidFill>
-                  <a:schemeClr val="tx1">
-                    <a:tint val="75000"/>
-                  </a:schemeClr>
-                </a:solidFill>
-              </a:defRPr>
+              <a:defRPr sz="1200"/>
             </a:lvl9pPr>
           </a:lstStyle>
           <a:p>
@@ -727,12 +712,13 @@
               <a:rPr lang="en-US"/>
               <a:t>Click to edit Master subtitle style</a:t>
             </a:r>
-          </a:p>
-        </p:txBody>
-      </p:sp>
-      <p:sp>
-        <p:nvSpPr>
-          <p:cNvPr id="4" name="Date Placeholder 3"/>
+            <a:endParaRPr lang="en-US" dirty="0"/>
+          </a:p>
+        </p:txBody>
+      </p:sp>
+      <p:sp>
+        <p:nvSpPr>
+          <p:cNvPr id="7" name="Date Placeholder 6"/>
           <p:cNvSpPr>
             <a:spLocks noGrp="1"/>
           </p:cNvSpPr>
@@ -747,7 +733,7 @@
           <a:p>
             <a:fld id="{241EB5C9-1307-BA42-ABA2-0BC069CD8E7F}" type="datetimeFigureOut">
               <a:rPr lang="en-US" smtClean="0"/>
-              <a:t>1/2/22</a:t>
+              <a:t>27-Apr-23</a:t>
             </a:fld>
             <a:endParaRPr lang="en-US"/>
           </a:p>
@@ -755,7 +741,7 @@
       </p:sp>
       <p:sp>
         <p:nvSpPr>
-          <p:cNvPr id="5" name="Footer Placeholder 4"/>
+          <p:cNvPr id="8" name="Footer Placeholder 7"/>
           <p:cNvSpPr>
             <a:spLocks noGrp="1"/>
           </p:cNvSpPr>
@@ -774,7 +760,7 @@
       </p:sp>
       <p:sp>
         <p:nvSpPr>
-          <p:cNvPr id="6" name="Slide Number Placeholder 5"/>
+          <p:cNvPr id="9" name="Slide Number Placeholder 8"/>
           <p:cNvSpPr>
             <a:spLocks noGrp="1"/>
           </p:cNvSpPr>
@@ -798,12 +784,12 @@
     </p:spTree>
     <p:extLst>
       <p:ext uri="{BB962C8B-B14F-4D97-AF65-F5344CB8AC3E}">
-        <p14:creationId xmlns:p14="http://schemas.microsoft.com/office/powerpoint/2010/main" val="1444357513"/>
+        <p14:creationId xmlns:p14="http://schemas.microsoft.com/office/powerpoint/2010/main" val="190632061"/>
       </p:ext>
     </p:extLst>
   </p:cSld>
   <p:clrMapOvr>
-    <a:masterClrMapping/>
+    <a:overrideClrMapping bg1="dk1" tx1="lt1" bg2="dk2" tx2="lt2" accent1="accent1" accent2="accent2" accent3="accent3" accent4="accent4" accent5="accent5" accent6="accent6" hlink="hlink" folHlink="folHlink"/>
   </p:clrMapOvr>
 </p:sldLayout>
 </file>
@@ -844,6 +830,7 @@
               <a:rPr lang="en-US"/>
               <a:t>Click to edit Master title style</a:t>
             </a:r>
+            <a:endParaRPr lang="en-US" dirty="0"/>
           </a:p>
         </p:txBody>
       </p:sp>
@@ -895,6 +882,7 @@
               <a:rPr lang="en-US"/>
               <a:t>Fifth level</a:t>
             </a:r>
+            <a:endParaRPr lang="en-US" dirty="0"/>
           </a:p>
         </p:txBody>
       </p:sp>
@@ -915,7 +903,7 @@
           <a:p>
             <a:fld id="{241EB5C9-1307-BA42-ABA2-0BC069CD8E7F}" type="datetimeFigureOut">
               <a:rPr lang="en-US" smtClean="0"/>
-              <a:t>1/2/22</a:t>
+              <a:t>27-Apr-23</a:t>
             </a:fld>
             <a:endParaRPr lang="en-US"/>
           </a:p>
@@ -966,7 +954,7 @@
     </p:spTree>
     <p:extLst>
       <p:ext uri="{BB962C8B-B14F-4D97-AF65-F5344CB8AC3E}">
-        <p14:creationId xmlns:p14="http://schemas.microsoft.com/office/powerpoint/2010/main" val="313914798"/>
+        <p14:creationId xmlns:p14="http://schemas.microsoft.com/office/powerpoint/2010/main" val="3642294258"/>
       </p:ext>
     </p:extLst>
   </p:cSld>
@@ -1005,8 +993,8 @@
         </p:nvSpPr>
         <p:spPr>
           <a:xfrm>
-            <a:off x="6629400" y="205979"/>
-            <a:ext cx="2057400" cy="4388644"/>
+            <a:off x="6489834" y="702945"/>
+            <a:ext cx="973956" cy="3737610"/>
           </a:xfrm>
         </p:spPr>
         <p:txBody>
@@ -1017,6 +1005,7 @@
               <a:rPr lang="en-US"/>
               <a:t>Click to edit Master title style</a:t>
             </a:r>
+            <a:endParaRPr lang="en-US" dirty="0"/>
           </a:p>
         </p:txBody>
       </p:sp>
@@ -1032,8 +1021,8 @@
         </p:nvSpPr>
         <p:spPr>
           <a:xfrm>
-            <a:off x="457200" y="205979"/>
-            <a:ext cx="6019800" cy="4388644"/>
+            <a:off x="1673352" y="702945"/>
+            <a:ext cx="4648867" cy="3737610"/>
           </a:xfrm>
         </p:spPr>
         <p:txBody>
@@ -1073,6 +1062,7 @@
               <a:rPr lang="en-US"/>
               <a:t>Fifth level</a:t>
             </a:r>
+            <a:endParaRPr lang="en-US" dirty="0"/>
           </a:p>
         </p:txBody>
       </p:sp>
@@ -1093,7 +1083,7 @@
           <a:p>
             <a:fld id="{241EB5C9-1307-BA42-ABA2-0BC069CD8E7F}" type="datetimeFigureOut">
               <a:rPr lang="en-US" smtClean="0"/>
-              <a:t>1/2/22</a:t>
+              <a:t>27-Apr-23</a:t>
             </a:fld>
             <a:endParaRPr lang="en-US"/>
           </a:p>
@@ -1144,7 +1134,7 @@
     </p:spTree>
     <p:extLst>
       <p:ext uri="{BB962C8B-B14F-4D97-AF65-F5344CB8AC3E}">
-        <p14:creationId xmlns:p14="http://schemas.microsoft.com/office/powerpoint/2010/main" val="2581529045"/>
+        <p14:creationId xmlns:p14="http://schemas.microsoft.com/office/powerpoint/2010/main" val="147553094"/>
       </p:ext>
     </p:extLst>
   </p:cSld>
@@ -1190,6 +1180,7 @@
               <a:rPr lang="en-US"/>
               <a:t>Click to edit Master title style</a:t>
             </a:r>
+            <a:endParaRPr lang="en-US" dirty="0"/>
           </a:p>
         </p:txBody>
       </p:sp>
@@ -1241,12 +1232,13 @@
               <a:rPr lang="en-US"/>
               <a:t>Fifth level</a:t>
             </a:r>
-          </a:p>
-        </p:txBody>
-      </p:sp>
-      <p:sp>
-        <p:nvSpPr>
-          <p:cNvPr id="4" name="Date Placeholder 3"/>
+            <a:endParaRPr lang="en-US" dirty="0"/>
+          </a:p>
+        </p:txBody>
+      </p:sp>
+      <p:sp>
+        <p:nvSpPr>
+          <p:cNvPr id="7" name="Date Placeholder 6"/>
           <p:cNvSpPr>
             <a:spLocks noGrp="1"/>
           </p:cNvSpPr>
@@ -1261,7 +1253,7 @@
           <a:p>
             <a:fld id="{241EB5C9-1307-BA42-ABA2-0BC069CD8E7F}" type="datetimeFigureOut">
               <a:rPr lang="en-US" smtClean="0"/>
-              <a:t>1/2/22</a:t>
+              <a:t>27-Apr-23</a:t>
             </a:fld>
             <a:endParaRPr lang="en-US"/>
           </a:p>
@@ -1269,7 +1261,7 @@
       </p:sp>
       <p:sp>
         <p:nvSpPr>
-          <p:cNvPr id="5" name="Footer Placeholder 4"/>
+          <p:cNvPr id="8" name="Footer Placeholder 7"/>
           <p:cNvSpPr>
             <a:spLocks noGrp="1"/>
           </p:cNvSpPr>
@@ -1288,7 +1280,7 @@
       </p:sp>
       <p:sp>
         <p:nvSpPr>
-          <p:cNvPr id="6" name="Slide Number Placeholder 5"/>
+          <p:cNvPr id="9" name="Slide Number Placeholder 8"/>
           <p:cNvSpPr>
             <a:spLocks noGrp="1"/>
           </p:cNvSpPr>
@@ -1312,7 +1304,7 @@
     </p:spTree>
     <p:extLst>
       <p:ext uri="{BB962C8B-B14F-4D97-AF65-F5344CB8AC3E}">
-        <p14:creationId xmlns:p14="http://schemas.microsoft.com/office/powerpoint/2010/main" val="338346009"/>
+        <p14:creationId xmlns:p14="http://schemas.microsoft.com/office/powerpoint/2010/main" val="260322980"/>
       </p:ext>
     </p:extLst>
   </p:cSld>
@@ -1325,6 +1317,14 @@
 <file path=ppt/slideLayouts/slideLayout3.xml><?xml version="1.0" encoding="utf-8"?>
 <p:sldLayout xmlns:a="http://schemas.openxmlformats.org/drawingml/2006/main" xmlns:r="http://schemas.openxmlformats.org/officeDocument/2006/relationships" xmlns:p="http://schemas.openxmlformats.org/presentationml/2006/main" type="secHead" preserve="1">
   <p:cSld name="Section Header">
+    <p:bg>
+      <p:bgPr>
+        <a:solidFill>
+          <a:schemeClr val="accent1"/>
+        </a:solidFill>
+        <a:effectLst/>
+      </p:bgPr>
+    </p:bg>
     <p:spTree>
       <p:nvGrpSpPr>
         <p:cNvPr id="1" name=""/>
@@ -1349,59 +1349,74 @@
             <p:ph type="title"/>
           </p:nvPr>
         </p:nvSpPr>
+        <p:spPr bwMode="blackWhite">
+          <a:xfrm>
+            <a:off x="1200150" y="1790058"/>
+            <a:ext cx="6743700" cy="1234440"/>
+          </a:xfrm>
+          <a:solidFill>
+            <a:srgbClr val="FFFFFF"/>
+          </a:solidFill>
+          <a:ln w="38100">
+            <a:solidFill>
+              <a:srgbClr val="404040"/>
+            </a:solidFill>
+          </a:ln>
+        </p:spPr>
+        <p:txBody>
+          <a:bodyPr lIns="274320" rIns="274320" anchor="ctr" anchorCtr="1">
+            <a:normAutofit/>
+          </a:bodyPr>
+          <a:lstStyle>
+            <a:lvl1pPr>
+              <a:defRPr sz="2850">
+                <a:solidFill>
+                  <a:srgbClr val="262626"/>
+                </a:solidFill>
+              </a:defRPr>
+            </a:lvl1pPr>
+          </a:lstStyle>
+          <a:p>
+            <a:r>
+              <a:rPr lang="en-US"/>
+              <a:t>Click to edit Master title style</a:t>
+            </a:r>
+            <a:endParaRPr lang="en-US" dirty="0"/>
+          </a:p>
+        </p:txBody>
+      </p:sp>
+      <p:sp>
+        <p:nvSpPr>
+          <p:cNvPr id="3" name="Text Placeholder 2"/>
+          <p:cNvSpPr>
+            <a:spLocks noGrp="1"/>
+          </p:cNvSpPr>
+          <p:nvPr>
+            <p:ph type="body" idx="1"/>
+          </p:nvPr>
+        </p:nvSpPr>
         <p:spPr>
           <a:xfrm>
-            <a:off x="722313" y="3305176"/>
-            <a:ext cx="7772400" cy="1021556"/>
+            <a:off x="2021396" y="3264349"/>
+            <a:ext cx="5101209" cy="948812"/>
           </a:xfrm>
         </p:spPr>
         <p:txBody>
-          <a:bodyPr anchor="t"/>
-          <a:lstStyle>
-            <a:lvl1pPr algn="l">
-              <a:defRPr sz="3000" b="1" cap="all"/>
-            </a:lvl1pPr>
-          </a:lstStyle>
-          <a:p>
-            <a:r>
-              <a:rPr lang="en-US"/>
-              <a:t>Click to edit Master title style</a:t>
-            </a:r>
-          </a:p>
-        </p:txBody>
-      </p:sp>
-      <p:sp>
-        <p:nvSpPr>
-          <p:cNvPr id="3" name="Text Placeholder 2"/>
-          <p:cNvSpPr>
-            <a:spLocks noGrp="1"/>
-          </p:cNvSpPr>
-          <p:nvPr>
-            <p:ph type="body" idx="1"/>
-          </p:nvPr>
-        </p:nvSpPr>
-        <p:spPr>
-          <a:xfrm>
-            <a:off x="722313" y="2180035"/>
-            <a:ext cx="7772400" cy="1125140"/>
-          </a:xfrm>
-        </p:spPr>
-        <p:txBody>
-          <a:bodyPr anchor="b"/>
+          <a:bodyPr anchor="t" anchorCtr="1">
+            <a:normAutofit/>
+          </a:bodyPr>
           <a:lstStyle>
             <a:lvl1pPr marL="0" indent="0">
               <a:buNone/>
               <a:defRPr sz="1500">
                 <a:solidFill>
-                  <a:schemeClr val="tx1">
-                    <a:tint val="75000"/>
-                  </a:schemeClr>
+                  <a:schemeClr val="tx1"/>
                 </a:solidFill>
               </a:defRPr>
             </a:lvl1pPr>
             <a:lvl2pPr marL="342900" indent="0">
               <a:buNone/>
-              <a:defRPr sz="1350">
+              <a:defRPr sz="1500">
                 <a:solidFill>
                   <a:schemeClr val="tx1">
                     <a:tint val="75000"/>
@@ -1411,7 +1426,7 @@
             </a:lvl2pPr>
             <a:lvl3pPr marL="685800" indent="0">
               <a:buNone/>
-              <a:defRPr sz="1200">
+              <a:defRPr sz="1350">
                 <a:solidFill>
                   <a:schemeClr val="tx1">
                     <a:tint val="75000"/>
@@ -1421,7 +1436,7 @@
             </a:lvl3pPr>
             <a:lvl4pPr marL="1028700" indent="0">
               <a:buNone/>
-              <a:defRPr sz="1050">
+              <a:defRPr sz="1200">
                 <a:solidFill>
                   <a:schemeClr val="tx1">
                     <a:tint val="75000"/>
@@ -1431,7 +1446,7 @@
             </a:lvl4pPr>
             <a:lvl5pPr marL="1371600" indent="0">
               <a:buNone/>
-              <a:defRPr sz="1050">
+              <a:defRPr sz="1200">
                 <a:solidFill>
                   <a:schemeClr val="tx1">
                     <a:tint val="75000"/>
@@ -1441,7 +1456,7 @@
             </a:lvl5pPr>
             <a:lvl6pPr marL="1714500" indent="0">
               <a:buNone/>
-              <a:defRPr sz="1050">
+              <a:defRPr sz="1200">
                 <a:solidFill>
                   <a:schemeClr val="tx1">
                     <a:tint val="75000"/>
@@ -1451,7 +1466,7 @@
             </a:lvl6pPr>
             <a:lvl7pPr marL="2057400" indent="0">
               <a:buNone/>
-              <a:defRPr sz="1050">
+              <a:defRPr sz="1200">
                 <a:solidFill>
                   <a:schemeClr val="tx1">
                     <a:tint val="75000"/>
@@ -1461,7 +1476,7 @@
             </a:lvl7pPr>
             <a:lvl8pPr marL="2400300" indent="0">
               <a:buNone/>
-              <a:defRPr sz="1050">
+              <a:defRPr sz="1200">
                 <a:solidFill>
                   <a:schemeClr val="tx1">
                     <a:tint val="75000"/>
@@ -1471,7 +1486,7 @@
             </a:lvl8pPr>
             <a:lvl9pPr marL="2743200" indent="0">
               <a:buNone/>
-              <a:defRPr sz="1050">
+              <a:defRPr sz="1200">
                 <a:solidFill>
                   <a:schemeClr val="tx1">
                     <a:tint val="75000"/>
@@ -1491,7 +1506,7 @@
       </p:sp>
       <p:sp>
         <p:nvSpPr>
-          <p:cNvPr id="4" name="Date Placeholder 3"/>
+          <p:cNvPr id="7" name="Date Placeholder 6"/>
           <p:cNvSpPr>
             <a:spLocks noGrp="1"/>
           </p:cNvSpPr>
@@ -1506,7 +1521,7 @@
           <a:p>
             <a:fld id="{241EB5C9-1307-BA42-ABA2-0BC069CD8E7F}" type="datetimeFigureOut">
               <a:rPr lang="en-US" smtClean="0"/>
-              <a:t>1/2/22</a:t>
+              <a:t>27-Apr-23</a:t>
             </a:fld>
             <a:endParaRPr lang="en-US"/>
           </a:p>
@@ -1514,7 +1529,7 @@
       </p:sp>
       <p:sp>
         <p:nvSpPr>
-          <p:cNvPr id="5" name="Footer Placeholder 4"/>
+          <p:cNvPr id="8" name="Footer Placeholder 7"/>
           <p:cNvSpPr>
             <a:spLocks noGrp="1"/>
           </p:cNvSpPr>
@@ -1533,7 +1548,7 @@
       </p:sp>
       <p:sp>
         <p:nvSpPr>
-          <p:cNvPr id="6" name="Slide Number Placeholder 5"/>
+          <p:cNvPr id="9" name="Slide Number Placeholder 8"/>
           <p:cNvSpPr>
             <a:spLocks noGrp="1"/>
           </p:cNvSpPr>
@@ -1557,12 +1572,12 @@
     </p:spTree>
     <p:extLst>
       <p:ext uri="{BB962C8B-B14F-4D97-AF65-F5344CB8AC3E}">
-        <p14:creationId xmlns:p14="http://schemas.microsoft.com/office/powerpoint/2010/main" val="1073069076"/>
+        <p14:creationId xmlns:p14="http://schemas.microsoft.com/office/powerpoint/2010/main" val="3465190411"/>
       </p:ext>
     </p:extLst>
   </p:cSld>
   <p:clrMapOvr>
-    <a:masterClrMapping/>
+    <a:overrideClrMapping bg1="dk1" tx1="lt1" bg2="dk2" tx2="lt2" accent1="accent1" accent2="accent2" accent3="accent3" accent4="accent4" accent5="accent5" accent6="accent6" hlink="hlink" folHlink="folHlink"/>
   </p:clrMapOvr>
 </p:sldLayout>
 </file>
@@ -1603,6 +1618,7 @@
               <a:rPr lang="en-US"/>
               <a:t>Click to edit Master title style</a:t>
             </a:r>
+            <a:endParaRPr lang="en-US" dirty="0"/>
           </a:p>
         </p:txBody>
       </p:sp>
@@ -1618,41 +1634,13 @@
         </p:nvSpPr>
         <p:spPr>
           <a:xfrm>
-            <a:off x="457200" y="1200151"/>
-            <a:ext cx="4038600" cy="3394472"/>
+            <a:off x="1186434" y="1978533"/>
+            <a:ext cx="3203828" cy="2326487"/>
           </a:xfrm>
         </p:spPr>
         <p:txBody>
           <a:bodyPr/>
-          <a:lstStyle>
-            <a:lvl1pPr>
-              <a:defRPr sz="2100"/>
-            </a:lvl1pPr>
-            <a:lvl2pPr>
-              <a:defRPr sz="1800"/>
-            </a:lvl2pPr>
-            <a:lvl3pPr>
-              <a:defRPr sz="1500"/>
-            </a:lvl3pPr>
-            <a:lvl4pPr>
-              <a:defRPr sz="1350"/>
-            </a:lvl4pPr>
-            <a:lvl5pPr>
-              <a:defRPr sz="1350"/>
-            </a:lvl5pPr>
-            <a:lvl6pPr>
-              <a:defRPr sz="1350"/>
-            </a:lvl6pPr>
-            <a:lvl7pPr>
-              <a:defRPr sz="1350"/>
-            </a:lvl7pPr>
-            <a:lvl8pPr>
-              <a:defRPr sz="1350"/>
-            </a:lvl8pPr>
-            <a:lvl9pPr>
-              <a:defRPr sz="1350"/>
-            </a:lvl9pPr>
-          </a:lstStyle>
+          <a:lstStyle/>
           <a:p>
             <a:pPr lvl="0"/>
             <a:r>
@@ -1687,6 +1675,7 @@
               <a:rPr lang="en-US"/>
               <a:t>Fifth level</a:t>
             </a:r>
+            <a:endParaRPr lang="en-US" dirty="0"/>
           </a:p>
         </p:txBody>
       </p:sp>
@@ -1702,41 +1691,13 @@
         </p:nvSpPr>
         <p:spPr>
           <a:xfrm>
-            <a:off x="4648200" y="1200151"/>
-            <a:ext cx="4038600" cy="3394472"/>
+            <a:off x="4753737" y="1978533"/>
+            <a:ext cx="3202685" cy="2326487"/>
           </a:xfrm>
         </p:spPr>
         <p:txBody>
           <a:bodyPr/>
-          <a:lstStyle>
-            <a:lvl1pPr>
-              <a:defRPr sz="2100"/>
-            </a:lvl1pPr>
-            <a:lvl2pPr>
-              <a:defRPr sz="1800"/>
-            </a:lvl2pPr>
-            <a:lvl3pPr>
-              <a:defRPr sz="1500"/>
-            </a:lvl3pPr>
-            <a:lvl4pPr>
-              <a:defRPr sz="1350"/>
-            </a:lvl4pPr>
-            <a:lvl5pPr>
-              <a:defRPr sz="1350"/>
-            </a:lvl5pPr>
-            <a:lvl6pPr>
-              <a:defRPr sz="1350"/>
-            </a:lvl6pPr>
-            <a:lvl7pPr>
-              <a:defRPr sz="1350"/>
-            </a:lvl7pPr>
-            <a:lvl8pPr>
-              <a:defRPr sz="1350"/>
-            </a:lvl8pPr>
-            <a:lvl9pPr>
-              <a:defRPr sz="1350"/>
-            </a:lvl9pPr>
-          </a:lstStyle>
+          <a:lstStyle/>
           <a:p>
             <a:pPr lvl="0"/>
             <a:r>
@@ -1771,12 +1732,13 @@
               <a:rPr lang="en-US"/>
               <a:t>Fifth level</a:t>
             </a:r>
-          </a:p>
-        </p:txBody>
-      </p:sp>
-      <p:sp>
-        <p:nvSpPr>
-          <p:cNvPr id="5" name="Date Placeholder 4"/>
+            <a:endParaRPr lang="en-US" dirty="0"/>
+          </a:p>
+        </p:txBody>
+      </p:sp>
+      <p:sp>
+        <p:nvSpPr>
+          <p:cNvPr id="8" name="Date Placeholder 7"/>
           <p:cNvSpPr>
             <a:spLocks noGrp="1"/>
           </p:cNvSpPr>
@@ -1791,7 +1753,7 @@
           <a:p>
             <a:fld id="{241EB5C9-1307-BA42-ABA2-0BC069CD8E7F}" type="datetimeFigureOut">
               <a:rPr lang="en-US" smtClean="0"/>
-              <a:t>1/2/22</a:t>
+              <a:t>27-Apr-23</a:t>
             </a:fld>
             <a:endParaRPr lang="en-US"/>
           </a:p>
@@ -1799,7 +1761,7 @@
       </p:sp>
       <p:sp>
         <p:nvSpPr>
-          <p:cNvPr id="6" name="Footer Placeholder 5"/>
+          <p:cNvPr id="9" name="Footer Placeholder 8"/>
           <p:cNvSpPr>
             <a:spLocks noGrp="1"/>
           </p:cNvSpPr>
@@ -1818,7 +1780,7 @@
       </p:sp>
       <p:sp>
         <p:nvSpPr>
-          <p:cNvPr id="7" name="Slide Number Placeholder 6"/>
+          <p:cNvPr id="10" name="Slide Number Placeholder 9"/>
           <p:cNvSpPr>
             <a:spLocks noGrp="1"/>
           </p:cNvSpPr>
@@ -1842,7 +1804,7 @@
     </p:spTree>
     <p:extLst>
       <p:ext uri="{BB962C8B-B14F-4D97-AF65-F5344CB8AC3E}">
-        <p14:creationId xmlns:p14="http://schemas.microsoft.com/office/powerpoint/2010/main" val="2619886245"/>
+        <p14:creationId xmlns:p14="http://schemas.microsoft.com/office/powerpoint/2010/main" val="2098286984"/>
       </p:ext>
     </p:extLst>
   </p:cSld>
@@ -1871,32 +1833,6 @@
       </p:grpSpPr>
       <p:sp>
         <p:nvSpPr>
-          <p:cNvPr id="2" name="Title 1"/>
-          <p:cNvSpPr>
-            <a:spLocks noGrp="1"/>
-          </p:cNvSpPr>
-          <p:nvPr>
-            <p:ph type="title"/>
-          </p:nvPr>
-        </p:nvSpPr>
-        <p:spPr/>
-        <p:txBody>
-          <a:bodyPr/>
-          <a:lstStyle>
-            <a:lvl1pPr>
-              <a:defRPr/>
-            </a:lvl1pPr>
-          </a:lstStyle>
-          <a:p>
-            <a:r>
-              <a:rPr lang="en-US"/>
-              <a:t>Click to edit Master title style</a:t>
-            </a:r>
-          </a:p>
-        </p:txBody>
-      </p:sp>
-      <p:sp>
-        <p:nvSpPr>
           <p:cNvPr id="3" name="Text Placeholder 2"/>
           <p:cNvSpPr>
             <a:spLocks noGrp="1"/>
@@ -1907,20 +1843,28 @@
         </p:nvSpPr>
         <p:spPr>
           <a:xfrm>
-            <a:off x="457200" y="1151335"/>
-            <a:ext cx="4040188" cy="479822"/>
+            <a:off x="1187577" y="1735075"/>
+            <a:ext cx="3202686" cy="528065"/>
           </a:xfrm>
         </p:spPr>
         <p:txBody>
-          <a:bodyPr anchor="b"/>
+          <a:bodyPr anchor="b" anchorCtr="1">
+            <a:normAutofit/>
+          </a:bodyPr>
           <a:lstStyle>
-            <a:lvl1pPr marL="0" indent="0">
-              <a:buNone/>
-              <a:defRPr sz="1800" b="1"/>
+            <a:lvl1pPr marL="0" indent="0" algn="ctr">
+              <a:buNone/>
+              <a:defRPr sz="1425" b="0" cap="all" spc="75" baseline="0">
+                <a:solidFill>
+                  <a:schemeClr val="accent2">
+                    <a:lumMod val="75000"/>
+                  </a:schemeClr>
+                </a:solidFill>
+              </a:defRPr>
             </a:lvl1pPr>
             <a:lvl2pPr marL="342900" indent="0">
               <a:buNone/>
-              <a:defRPr sz="1500" b="1"/>
+              <a:defRPr sz="1425" b="1"/>
             </a:lvl2pPr>
             <a:lvl3pPr marL="685800" indent="0">
               <a:buNone/>
@@ -1972,41 +1916,13 @@
         </p:nvSpPr>
         <p:spPr>
           <a:xfrm>
-            <a:off x="457200" y="1631156"/>
-            <a:ext cx="4040188" cy="2963466"/>
+            <a:off x="1187577" y="2357438"/>
+            <a:ext cx="3202686" cy="1947582"/>
           </a:xfrm>
         </p:spPr>
         <p:txBody>
           <a:bodyPr/>
-          <a:lstStyle>
-            <a:lvl1pPr>
-              <a:defRPr sz="1800"/>
-            </a:lvl1pPr>
-            <a:lvl2pPr>
-              <a:defRPr sz="1500"/>
-            </a:lvl2pPr>
-            <a:lvl3pPr>
-              <a:defRPr sz="1350"/>
-            </a:lvl3pPr>
-            <a:lvl4pPr>
-              <a:defRPr sz="1200"/>
-            </a:lvl4pPr>
-            <a:lvl5pPr>
-              <a:defRPr sz="1200"/>
-            </a:lvl5pPr>
-            <a:lvl6pPr>
-              <a:defRPr sz="1200"/>
-            </a:lvl6pPr>
-            <a:lvl7pPr>
-              <a:defRPr sz="1200"/>
-            </a:lvl7pPr>
-            <a:lvl8pPr>
-              <a:defRPr sz="1200"/>
-            </a:lvl8pPr>
-            <a:lvl9pPr>
-              <a:defRPr sz="1200"/>
-            </a:lvl9pPr>
-          </a:lstStyle>
+          <a:lstStyle/>
           <a:p>
             <a:pPr lvl="0"/>
             <a:r>
@@ -2041,35 +1957,105 @@
               <a:rPr lang="en-US"/>
               <a:t>Fifth level</a:t>
             </a:r>
-          </a:p>
-        </p:txBody>
-      </p:sp>
-      <p:sp>
-        <p:nvSpPr>
-          <p:cNvPr id="5" name="Text Placeholder 4"/>
-          <p:cNvSpPr>
-            <a:spLocks noGrp="1"/>
-          </p:cNvSpPr>
-          <p:nvPr>
-            <p:ph type="body" sz="quarter" idx="3"/>
+            <a:endParaRPr lang="en-US" dirty="0"/>
+          </a:p>
+        </p:txBody>
+      </p:sp>
+      <p:sp>
+        <p:nvSpPr>
+          <p:cNvPr id="6" name="Content Placeholder 5"/>
+          <p:cNvSpPr>
+            <a:spLocks noGrp="1"/>
+          </p:cNvSpPr>
+          <p:nvPr>
+            <p:ph sz="quarter" idx="4"/>
           </p:nvPr>
         </p:nvSpPr>
         <p:spPr>
           <a:xfrm>
-            <a:off x="4645026" y="1151335"/>
-            <a:ext cx="4041775" cy="479822"/>
+            <a:off x="4753737" y="2357438"/>
+            <a:ext cx="3190113" cy="1947582"/>
           </a:xfrm>
         </p:spPr>
         <p:txBody>
-          <a:bodyPr anchor="b"/>
+          <a:bodyPr/>
           <a:lstStyle>
-            <a:lvl1pPr marL="0" indent="0">
-              <a:buNone/>
-              <a:defRPr sz="1800" b="1"/>
+            <a:lvl5pPr>
+              <a:defRPr/>
+            </a:lvl5pPr>
+          </a:lstStyle>
+          <a:p>
+            <a:pPr lvl="0"/>
+            <a:r>
+              <a:rPr lang="en-US"/>
+              <a:t>Click to edit Master text styles</a:t>
+            </a:r>
+          </a:p>
+          <a:p>
+            <a:pPr lvl="1"/>
+            <a:r>
+              <a:rPr lang="en-US"/>
+              <a:t>Second level</a:t>
+            </a:r>
+          </a:p>
+          <a:p>
+            <a:pPr lvl="2"/>
+            <a:r>
+              <a:rPr lang="en-US"/>
+              <a:t>Third level</a:t>
+            </a:r>
+          </a:p>
+          <a:p>
+            <a:pPr lvl="3"/>
+            <a:r>
+              <a:rPr lang="en-US"/>
+              <a:t>Fourth level</a:t>
+            </a:r>
+          </a:p>
+          <a:p>
+            <a:pPr lvl="4"/>
+            <a:r>
+              <a:rPr lang="en-US"/>
+              <a:t>Fifth level</a:t>
+            </a:r>
+            <a:endParaRPr lang="en-US" dirty="0"/>
+          </a:p>
+        </p:txBody>
+      </p:sp>
+      <p:sp>
+        <p:nvSpPr>
+          <p:cNvPr id="11" name="Text Placeholder 4"/>
+          <p:cNvSpPr>
+            <a:spLocks noGrp="1"/>
+          </p:cNvSpPr>
+          <p:nvPr>
+            <p:ph type="body" sz="quarter" idx="13"/>
+          </p:nvPr>
+        </p:nvSpPr>
+        <p:spPr>
+          <a:xfrm>
+            <a:off x="4753737" y="1735075"/>
+            <a:ext cx="3202686" cy="528065"/>
+          </a:xfrm>
+        </p:spPr>
+        <p:txBody>
+          <a:bodyPr anchor="b" anchorCtr="1">
+            <a:normAutofit/>
+          </a:bodyPr>
+          <a:lstStyle>
+            <a:lvl1pPr marL="0" indent="0" algn="ctr">
+              <a:buNone/>
+              <a:defRPr sz="1425" b="0" cap="all" spc="75" baseline="0">
+                <a:solidFill>
+                  <a:schemeClr val="accent2">
+                    <a:lumMod val="75000"/>
+                  </a:schemeClr>
+                </a:solidFill>
+              </a:defRPr>
             </a:lvl1pPr>
             <a:lvl2pPr marL="342900" indent="0">
               <a:buNone/>
-              <a:defRPr sz="1500" b="1"/>
+              <a:defRPr sz="1425" b="1"/>
             </a:lvl2pPr>
             <a:lvl3pPr marL="685800" indent="0">
               <a:buNone/>
@@ -2111,90 +2097,6 @@
       </p:sp>
       <p:sp>
         <p:nvSpPr>
-          <p:cNvPr id="6" name="Content Placeholder 5"/>
-          <p:cNvSpPr>
-            <a:spLocks noGrp="1"/>
-          </p:cNvSpPr>
-          <p:nvPr>
-            <p:ph sz="quarter" idx="4"/>
-          </p:nvPr>
-        </p:nvSpPr>
-        <p:spPr>
-          <a:xfrm>
-            <a:off x="4645026" y="1631156"/>
-            <a:ext cx="4041775" cy="2963466"/>
-          </a:xfrm>
-        </p:spPr>
-        <p:txBody>
-          <a:bodyPr/>
-          <a:lstStyle>
-            <a:lvl1pPr>
-              <a:defRPr sz="1800"/>
-            </a:lvl1pPr>
-            <a:lvl2pPr>
-              <a:defRPr sz="1500"/>
-            </a:lvl2pPr>
-            <a:lvl3pPr>
-              <a:defRPr sz="1350"/>
-            </a:lvl3pPr>
-            <a:lvl4pPr>
-              <a:defRPr sz="1200"/>
-            </a:lvl4pPr>
-            <a:lvl5pPr>
-              <a:defRPr sz="1200"/>
-            </a:lvl5pPr>
-            <a:lvl6pPr>
-              <a:defRPr sz="1200"/>
-            </a:lvl6pPr>
-            <a:lvl7pPr>
-              <a:defRPr sz="1200"/>
-            </a:lvl7pPr>
-            <a:lvl8pPr>
-              <a:defRPr sz="1200"/>
-            </a:lvl8pPr>
-            <a:lvl9pPr>
-              <a:defRPr sz="1200"/>
-            </a:lvl9pPr>
-          </a:lstStyle>
-          <a:p>
-            <a:pPr lvl="0"/>
-            <a:r>
-              <a:rPr lang="en-US"/>
-              <a:t>Click to edit Master text styles</a:t>
-            </a:r>
-          </a:p>
-          <a:p>
-            <a:pPr lvl="1"/>
-            <a:r>
-              <a:rPr lang="en-US"/>
-              <a:t>Second level</a:t>
-            </a:r>
-          </a:p>
-          <a:p>
-            <a:pPr lvl="2"/>
-            <a:r>
-              <a:rPr lang="en-US"/>
-              <a:t>Third level</a:t>
-            </a:r>
-          </a:p>
-          <a:p>
-            <a:pPr lvl="3"/>
-            <a:r>
-              <a:rPr lang="en-US"/>
-              <a:t>Fourth level</a:t>
-            </a:r>
-          </a:p>
-          <a:p>
-            <a:pPr lvl="4"/>
-            <a:r>
-              <a:rPr lang="en-US"/>
-              <a:t>Fifth level</a:t>
-            </a:r>
-          </a:p>
-        </p:txBody>
-      </p:sp>
-      <p:sp>
-        <p:nvSpPr>
           <p:cNvPr id="7" name="Date Placeholder 6"/>
           <p:cNvSpPr>
             <a:spLocks noGrp="1"/>
@@ -2210,7 +2112,7 @@
           <a:p>
             <a:fld id="{241EB5C9-1307-BA42-ABA2-0BC069CD8E7F}" type="datetimeFigureOut">
               <a:rPr lang="en-US" smtClean="0"/>
-              <a:t>1/2/22</a:t>
+              <a:t>27-Apr-23</a:t>
             </a:fld>
             <a:endParaRPr lang="en-US"/>
           </a:p>
@@ -2258,10 +2160,33 @@
           </a:p>
         </p:txBody>
       </p:sp>
+      <p:sp>
+        <p:nvSpPr>
+          <p:cNvPr id="10" name="Title 9"/>
+          <p:cNvSpPr>
+            <a:spLocks noGrp="1"/>
+          </p:cNvSpPr>
+          <p:nvPr>
+            <p:ph type="title"/>
+          </p:nvPr>
+        </p:nvSpPr>
+        <p:spPr/>
+        <p:txBody>
+          <a:bodyPr/>
+          <a:lstStyle/>
+          <a:p>
+            <a:r>
+              <a:rPr lang="en-US"/>
+              <a:t>Click to edit Master title style</a:t>
+            </a:r>
+            <a:endParaRPr lang="en-US" dirty="0"/>
+          </a:p>
+        </p:txBody>
+      </p:sp>
     </p:spTree>
     <p:extLst>
       <p:ext uri="{BB962C8B-B14F-4D97-AF65-F5344CB8AC3E}">
-        <p14:creationId xmlns:p14="http://schemas.microsoft.com/office/powerpoint/2010/main" val="2535793967"/>
+        <p14:creationId xmlns:p14="http://schemas.microsoft.com/office/powerpoint/2010/main" val="2347419057"/>
       </p:ext>
     </p:extLst>
   </p:cSld>
@@ -2307,6 +2232,7 @@
               <a:rPr lang="en-US"/>
               <a:t>Click to edit Master title style</a:t>
             </a:r>
+            <a:endParaRPr lang="en-US" dirty="0"/>
           </a:p>
         </p:txBody>
       </p:sp>
@@ -2327,7 +2253,7 @@
           <a:p>
             <a:fld id="{241EB5C9-1307-BA42-ABA2-0BC069CD8E7F}" type="datetimeFigureOut">
               <a:rPr lang="en-US" smtClean="0"/>
-              <a:t>1/2/22</a:t>
+              <a:t>27-Apr-23</a:t>
             </a:fld>
             <a:endParaRPr lang="en-US"/>
           </a:p>
@@ -2378,7 +2304,7 @@
     </p:spTree>
     <p:extLst>
       <p:ext uri="{BB962C8B-B14F-4D97-AF65-F5344CB8AC3E}">
-        <p14:creationId xmlns:p14="http://schemas.microsoft.com/office/powerpoint/2010/main" val="3472721253"/>
+        <p14:creationId xmlns:p14="http://schemas.microsoft.com/office/powerpoint/2010/main" val="1867388852"/>
       </p:ext>
     </p:extLst>
   </p:cSld>
@@ -2422,7 +2348,7 @@
           <a:p>
             <a:fld id="{241EB5C9-1307-BA42-ABA2-0BC069CD8E7F}" type="datetimeFigureOut">
               <a:rPr lang="en-US" smtClean="0"/>
-              <a:t>1/2/22</a:t>
+              <a:t>27-Apr-23</a:t>
             </a:fld>
             <a:endParaRPr lang="en-US"/>
           </a:p>
@@ -2473,7 +2399,7 @@
     </p:spTree>
     <p:extLst>
       <p:ext uri="{BB962C8B-B14F-4D97-AF65-F5344CB8AC3E}">
-        <p14:creationId xmlns:p14="http://schemas.microsoft.com/office/powerpoint/2010/main" val="2130901097"/>
+        <p14:creationId xmlns:p14="http://schemas.microsoft.com/office/powerpoint/2010/main" val="2512075400"/>
       </p:ext>
     </p:extLst>
   </p:cSld>
@@ -2502,229 +2428,326 @@
       </p:grpSpPr>
       <p:sp>
         <p:nvSpPr>
-          <p:cNvPr id="2" name="Title 1"/>
-          <p:cNvSpPr>
-            <a:spLocks noGrp="1"/>
-          </p:cNvSpPr>
-          <p:nvPr>
-            <p:ph type="title"/>
-          </p:nvPr>
+          <p:cNvPr id="26" name="Rectangle 25"/>
+          <p:cNvSpPr/>
+          <p:nvPr/>
         </p:nvSpPr>
         <p:spPr>
           <a:xfrm>
-            <a:off x="457201" y="204787"/>
-            <a:ext cx="3008313" cy="871538"/>
+            <a:off x="0" y="0"/>
+            <a:ext cx="4572000" cy="5143500"/>
+          </a:xfrm>
+          <a:prstGeom prst="rect">
+            <a:avLst/>
+          </a:prstGeom>
+          <a:solidFill>
+            <a:schemeClr val="accent2"/>
+          </a:solidFill>
+          <a:ln>
+            <a:noFill/>
+          </a:ln>
+        </p:spPr>
+        <p:style>
+          <a:lnRef idx="2">
+            <a:schemeClr val="accent1">
+              <a:shade val="50000"/>
+            </a:schemeClr>
+          </a:lnRef>
+          <a:fillRef idx="1">
+            <a:schemeClr val="accent1"/>
+          </a:fillRef>
+          <a:effectRef idx="0">
+            <a:schemeClr val="accent1"/>
+          </a:effectRef>
+          <a:fontRef idx="minor">
+            <a:schemeClr val="lt1"/>
+          </a:fontRef>
+        </p:style>
+      </p:sp>
+      <p:sp>
+        <p:nvSpPr>
+          <p:cNvPr id="2" name="Title 1"/>
+          <p:cNvSpPr>
+            <a:spLocks noGrp="1"/>
+          </p:cNvSpPr>
+          <p:nvPr>
+            <p:ph type="title"/>
+          </p:nvPr>
+        </p:nvSpPr>
+        <p:spPr bwMode="blackWhite">
+          <a:xfrm>
+            <a:off x="603504" y="1682871"/>
+            <a:ext cx="3364992" cy="856123"/>
+          </a:xfrm>
+          <a:solidFill>
+            <a:srgbClr val="FFFFFF"/>
+          </a:solidFill>
+          <a:ln>
+            <a:solidFill>
+              <a:srgbClr val="404040"/>
+            </a:solidFill>
+          </a:ln>
+        </p:spPr>
+        <p:txBody>
+          <a:bodyPr anchor="ctr" anchorCtr="1">
+            <a:normAutofit/>
+          </a:bodyPr>
+          <a:lstStyle>
+            <a:lvl1pPr>
+              <a:defRPr sz="1650">
+                <a:solidFill>
+                  <a:srgbClr val="262626"/>
+                </a:solidFill>
+              </a:defRPr>
+            </a:lvl1pPr>
+          </a:lstStyle>
+          <a:p>
+            <a:r>
+              <a:rPr lang="en-US"/>
+              <a:t>Click to edit Master title style</a:t>
+            </a:r>
+            <a:endParaRPr lang="en-US" dirty="0"/>
+          </a:p>
+        </p:txBody>
+      </p:sp>
+      <p:sp>
+        <p:nvSpPr>
+          <p:cNvPr id="3" name="Content Placeholder 2"/>
+          <p:cNvSpPr>
+            <a:spLocks noGrp="1"/>
+          </p:cNvSpPr>
+          <p:nvPr>
+            <p:ph idx="1"/>
+          </p:nvPr>
+        </p:nvSpPr>
+        <p:spPr>
+          <a:xfrm>
+            <a:off x="5052060" y="603504"/>
+            <a:ext cx="3611880" cy="3936492"/>
           </a:xfrm>
         </p:spPr>
         <p:txBody>
-          <a:bodyPr anchor="b"/>
+          <a:bodyPr>
+            <a:normAutofit/>
+          </a:bodyPr>
           <a:lstStyle>
-            <a:lvl1pPr algn="l">
-              <a:defRPr sz="1500" b="1"/>
+            <a:lvl1pPr>
+              <a:defRPr sz="1425">
+                <a:solidFill>
+                  <a:schemeClr val="tx1"/>
+                </a:solidFill>
+              </a:defRPr>
             </a:lvl1pPr>
+            <a:lvl2pPr>
+              <a:defRPr sz="1200">
+                <a:solidFill>
+                  <a:schemeClr val="tx1"/>
+                </a:solidFill>
+              </a:defRPr>
+            </a:lvl2pPr>
+            <a:lvl3pPr>
+              <a:defRPr sz="1200">
+                <a:solidFill>
+                  <a:schemeClr val="tx1"/>
+                </a:solidFill>
+              </a:defRPr>
+            </a:lvl3pPr>
+            <a:lvl4pPr>
+              <a:defRPr sz="1200">
+                <a:solidFill>
+                  <a:schemeClr val="tx1"/>
+                </a:solidFill>
+              </a:defRPr>
+            </a:lvl4pPr>
+            <a:lvl5pPr>
+              <a:defRPr sz="1200">
+                <a:solidFill>
+                  <a:schemeClr val="tx1"/>
+                </a:solidFill>
+              </a:defRPr>
+            </a:lvl5pPr>
+            <a:lvl6pPr>
+              <a:defRPr sz="1200"/>
+            </a:lvl6pPr>
+            <a:lvl7pPr>
+              <a:defRPr sz="1200"/>
+            </a:lvl7pPr>
+            <a:lvl8pPr>
+              <a:defRPr sz="1200"/>
+            </a:lvl8pPr>
+            <a:lvl9pPr>
+              <a:defRPr sz="1200"/>
+            </a:lvl9pPr>
           </a:lstStyle>
           <a:p>
-            <a:r>
-              <a:rPr lang="en-US"/>
-              <a:t>Click to edit Master title style</a:t>
-            </a:r>
-          </a:p>
-        </p:txBody>
-      </p:sp>
-      <p:sp>
-        <p:nvSpPr>
-          <p:cNvPr id="3" name="Content Placeholder 2"/>
-          <p:cNvSpPr>
-            <a:spLocks noGrp="1"/>
-          </p:cNvSpPr>
-          <p:nvPr>
-            <p:ph idx="1"/>
+            <a:pPr lvl="0"/>
+            <a:r>
+              <a:rPr lang="en-US"/>
+              <a:t>Click to edit Master text styles</a:t>
+            </a:r>
+          </a:p>
+          <a:p>
+            <a:pPr lvl="1"/>
+            <a:r>
+              <a:rPr lang="en-US"/>
+              <a:t>Second level</a:t>
+            </a:r>
+          </a:p>
+          <a:p>
+            <a:pPr lvl="2"/>
+            <a:r>
+              <a:rPr lang="en-US"/>
+              <a:t>Third level</a:t>
+            </a:r>
+          </a:p>
+          <a:p>
+            <a:pPr lvl="3"/>
+            <a:r>
+              <a:rPr lang="en-US"/>
+              <a:t>Fourth level</a:t>
+            </a:r>
+          </a:p>
+          <a:p>
+            <a:pPr lvl="4"/>
+            <a:r>
+              <a:rPr lang="en-US"/>
+              <a:t>Fifth level</a:t>
+            </a:r>
+            <a:endParaRPr lang="en-US" dirty="0"/>
+          </a:p>
+        </p:txBody>
+      </p:sp>
+      <p:sp>
+        <p:nvSpPr>
+          <p:cNvPr id="4" name="Text Placeholder 3"/>
+          <p:cNvSpPr>
+            <a:spLocks noGrp="1"/>
+          </p:cNvSpPr>
+          <p:nvPr>
+            <p:ph type="body" sz="half" idx="2"/>
           </p:nvPr>
         </p:nvSpPr>
         <p:spPr>
           <a:xfrm>
-            <a:off x="3575050" y="204788"/>
-            <a:ext cx="5111750" cy="4389835"/>
+            <a:off x="836676" y="2662439"/>
+            <a:ext cx="2846070" cy="1645527"/>
+          </a:xfrm>
+        </p:spPr>
+        <p:txBody>
+          <a:bodyPr anchor="t" anchorCtr="1">
+            <a:normAutofit/>
+          </a:bodyPr>
+          <a:lstStyle>
+            <a:lvl1pPr marL="0" indent="0" algn="ctr">
+              <a:buNone/>
+              <a:defRPr sz="1125">
+                <a:solidFill>
+                  <a:srgbClr val="FFFFFF"/>
+                </a:solidFill>
+              </a:defRPr>
+            </a:lvl1pPr>
+            <a:lvl2pPr marL="342900" indent="0">
+              <a:buNone/>
+              <a:defRPr sz="1050"/>
+            </a:lvl2pPr>
+            <a:lvl3pPr marL="685800" indent="0">
+              <a:buNone/>
+              <a:defRPr sz="900"/>
+            </a:lvl3pPr>
+            <a:lvl4pPr marL="1028700" indent="0">
+              <a:buNone/>
+              <a:defRPr sz="750"/>
+            </a:lvl4pPr>
+            <a:lvl5pPr marL="1371600" indent="0">
+              <a:buNone/>
+              <a:defRPr sz="750"/>
+            </a:lvl5pPr>
+            <a:lvl6pPr marL="1714500" indent="0">
+              <a:buNone/>
+              <a:defRPr sz="750"/>
+            </a:lvl6pPr>
+            <a:lvl7pPr marL="2057400" indent="0">
+              <a:buNone/>
+              <a:defRPr sz="750"/>
+            </a:lvl7pPr>
+            <a:lvl8pPr marL="2400300" indent="0">
+              <a:buNone/>
+              <a:defRPr sz="750"/>
+            </a:lvl8pPr>
+            <a:lvl9pPr marL="2743200" indent="0">
+              <a:buNone/>
+              <a:defRPr sz="750"/>
+            </a:lvl9pPr>
+          </a:lstStyle>
+          <a:p>
+            <a:pPr lvl="0"/>
+            <a:r>
+              <a:rPr lang="en-US"/>
+              <a:t>Click to edit Master text styles</a:t>
+            </a:r>
+          </a:p>
+        </p:txBody>
+      </p:sp>
+      <p:sp>
+        <p:nvSpPr>
+          <p:cNvPr id="9" name="Date Placeholder 8"/>
+          <p:cNvSpPr>
+            <a:spLocks noGrp="1"/>
+          </p:cNvSpPr>
+          <p:nvPr>
+            <p:ph type="dt" sz="half" idx="10"/>
+          </p:nvPr>
+        </p:nvSpPr>
+        <p:spPr/>
+        <p:txBody>
+          <a:bodyPr/>
+          <a:lstStyle/>
+          <a:p>
+            <a:fld id="{241EB5C9-1307-BA42-ABA2-0BC069CD8E7F}" type="datetimeFigureOut">
+              <a:rPr lang="en-US" smtClean="0"/>
+              <a:t>27-Apr-23</a:t>
+            </a:fld>
+            <a:endParaRPr lang="en-US"/>
+          </a:p>
+        </p:txBody>
+      </p:sp>
+      <p:sp>
+        <p:nvSpPr>
+          <p:cNvPr id="10" name="Footer Placeholder 9"/>
+          <p:cNvSpPr>
+            <a:spLocks noGrp="1"/>
+          </p:cNvSpPr>
+          <p:nvPr>
+            <p:ph type="ftr" sz="quarter" idx="11"/>
+          </p:nvPr>
+        </p:nvSpPr>
+        <p:spPr>
+          <a:xfrm>
+            <a:off x="603504" y="4677156"/>
+            <a:ext cx="3843598" cy="240030"/>
           </a:xfrm>
         </p:spPr>
         <p:txBody>
           <a:bodyPr/>
           <a:lstStyle>
             <a:lvl1pPr>
-              <a:defRPr sz="2400"/>
+              <a:defRPr>
+                <a:solidFill>
+                  <a:srgbClr val="FFFFFF">
+                    <a:alpha val="70000"/>
+                  </a:srgbClr>
+                </a:solidFill>
+              </a:defRPr>
             </a:lvl1pPr>
-            <a:lvl2pPr>
-              <a:defRPr sz="2100"/>
-            </a:lvl2pPr>
-            <a:lvl3pPr>
-              <a:defRPr sz="1800"/>
-            </a:lvl3pPr>
-            <a:lvl4pPr>
-              <a:defRPr sz="1500"/>
-            </a:lvl4pPr>
-            <a:lvl5pPr>
-              <a:defRPr sz="1500"/>
-            </a:lvl5pPr>
-            <a:lvl6pPr>
-              <a:defRPr sz="1500"/>
-            </a:lvl6pPr>
-            <a:lvl7pPr>
-              <a:defRPr sz="1500"/>
-            </a:lvl7pPr>
-            <a:lvl8pPr>
-              <a:defRPr sz="1500"/>
-            </a:lvl8pPr>
-            <a:lvl9pPr>
-              <a:defRPr sz="1500"/>
-            </a:lvl9pPr>
           </a:lstStyle>
           <a:p>
-            <a:pPr lvl="0"/>
-            <a:r>
-              <a:rPr lang="en-US"/>
-              <a:t>Click to edit Master text styles</a:t>
-            </a:r>
-          </a:p>
-          <a:p>
-            <a:pPr lvl="1"/>
-            <a:r>
-              <a:rPr lang="en-US"/>
-              <a:t>Second level</a:t>
-            </a:r>
-          </a:p>
-          <a:p>
-            <a:pPr lvl="2"/>
-            <a:r>
-              <a:rPr lang="en-US"/>
-              <a:t>Third level</a:t>
-            </a:r>
-          </a:p>
-          <a:p>
-            <a:pPr lvl="3"/>
-            <a:r>
-              <a:rPr lang="en-US"/>
-              <a:t>Fourth level</a:t>
-            </a:r>
-          </a:p>
-          <a:p>
-            <a:pPr lvl="4"/>
-            <a:r>
-              <a:rPr lang="en-US"/>
-              <a:t>Fifth level</a:t>
-            </a:r>
-          </a:p>
-        </p:txBody>
-      </p:sp>
-      <p:sp>
-        <p:nvSpPr>
-          <p:cNvPr id="4" name="Text Placeholder 3"/>
-          <p:cNvSpPr>
-            <a:spLocks noGrp="1"/>
-          </p:cNvSpPr>
-          <p:nvPr>
-            <p:ph type="body" sz="half" idx="2"/>
-          </p:nvPr>
-        </p:nvSpPr>
-        <p:spPr>
-          <a:xfrm>
-            <a:off x="457201" y="1076326"/>
-            <a:ext cx="3008313" cy="3518297"/>
-          </a:xfrm>
-        </p:spPr>
-        <p:txBody>
-          <a:bodyPr/>
-          <a:lstStyle>
-            <a:lvl1pPr marL="0" indent="0">
-              <a:buNone/>
-              <a:defRPr sz="1050"/>
-            </a:lvl1pPr>
-            <a:lvl2pPr marL="342900" indent="0">
-              <a:buNone/>
-              <a:defRPr sz="900"/>
-            </a:lvl2pPr>
-            <a:lvl3pPr marL="685800" indent="0">
-              <a:buNone/>
-              <a:defRPr sz="750"/>
-            </a:lvl3pPr>
-            <a:lvl4pPr marL="1028700" indent="0">
-              <a:buNone/>
-              <a:defRPr sz="675"/>
-            </a:lvl4pPr>
-            <a:lvl5pPr marL="1371600" indent="0">
-              <a:buNone/>
-              <a:defRPr sz="675"/>
-            </a:lvl5pPr>
-            <a:lvl6pPr marL="1714500" indent="0">
-              <a:buNone/>
-              <a:defRPr sz="675"/>
-            </a:lvl6pPr>
-            <a:lvl7pPr marL="2057400" indent="0">
-              <a:buNone/>
-              <a:defRPr sz="675"/>
-            </a:lvl7pPr>
-            <a:lvl8pPr marL="2400300" indent="0">
-              <a:buNone/>
-              <a:defRPr sz="675"/>
-            </a:lvl8pPr>
-            <a:lvl9pPr marL="2743200" indent="0">
-              <a:buNone/>
-              <a:defRPr sz="675"/>
-            </a:lvl9pPr>
-          </a:lstStyle>
-          <a:p>
-            <a:pPr lvl="0"/>
-            <a:r>
-              <a:rPr lang="en-US"/>
-              <a:t>Click to edit Master text styles</a:t>
-            </a:r>
-          </a:p>
-        </p:txBody>
-      </p:sp>
-      <p:sp>
-        <p:nvSpPr>
-          <p:cNvPr id="5" name="Date Placeholder 4"/>
-          <p:cNvSpPr>
-            <a:spLocks noGrp="1"/>
-          </p:cNvSpPr>
-          <p:nvPr>
-            <p:ph type="dt" sz="half" idx="10"/>
-          </p:nvPr>
-        </p:nvSpPr>
-        <p:spPr/>
-        <p:txBody>
-          <a:bodyPr/>
-          <a:lstStyle/>
-          <a:p>
-            <a:fld id="{241EB5C9-1307-BA42-ABA2-0BC069CD8E7F}" type="datetimeFigureOut">
-              <a:rPr lang="en-US" smtClean="0"/>
-              <a:t>1/2/22</a:t>
-            </a:fld>
             <a:endParaRPr lang="en-US"/>
           </a:p>
         </p:txBody>
       </p:sp>
       <p:sp>
         <p:nvSpPr>
-          <p:cNvPr id="6" name="Footer Placeholder 5"/>
-          <p:cNvSpPr>
-            <a:spLocks noGrp="1"/>
-          </p:cNvSpPr>
-          <p:nvPr>
-            <p:ph type="ftr" sz="quarter" idx="11"/>
-          </p:nvPr>
-        </p:nvSpPr>
-        <p:spPr/>
-        <p:txBody>
-          <a:bodyPr/>
-          <a:lstStyle/>
-          <a:p>
-            <a:endParaRPr lang="en-US"/>
-          </a:p>
-        </p:txBody>
-      </p:sp>
-      <p:sp>
-        <p:nvSpPr>
-          <p:cNvPr id="7" name="Slide Number Placeholder 6"/>
+          <p:cNvPr id="11" name="Slide Number Placeholder 10"/>
           <p:cNvSpPr>
             <a:spLocks noGrp="1"/>
           </p:cNvSpPr>
@@ -2748,7 +2771,7 @@
     </p:spTree>
     <p:extLst>
       <p:ext uri="{BB962C8B-B14F-4D97-AF65-F5344CB8AC3E}">
-        <p14:creationId xmlns:p14="http://schemas.microsoft.com/office/powerpoint/2010/main" val="3540895647"/>
+        <p14:creationId xmlns:p14="http://schemas.microsoft.com/office/powerpoint/2010/main" val="494838576"/>
       </p:ext>
     </p:extLst>
   </p:cSld>
@@ -2777,25 +2800,77 @@
       </p:grpSpPr>
       <p:sp>
         <p:nvSpPr>
-          <p:cNvPr id="2" name="Title 1"/>
-          <p:cNvSpPr>
-            <a:spLocks noGrp="1"/>
-          </p:cNvSpPr>
-          <p:nvPr>
-            <p:ph type="title"/>
-          </p:nvPr>
+          <p:cNvPr id="18" name="Rectangle 17"/>
+          <p:cNvSpPr/>
+          <p:nvPr/>
         </p:nvSpPr>
         <p:spPr>
           <a:xfrm>
-            <a:off x="1792288" y="3600450"/>
-            <a:ext cx="5486400" cy="425054"/>
+            <a:off x="1" y="0"/>
+            <a:ext cx="4571999" cy="5143500"/>
           </a:xfrm>
+          <a:prstGeom prst="rect">
+            <a:avLst/>
+          </a:prstGeom>
+          <a:solidFill>
+            <a:schemeClr val="accent2"/>
+          </a:solidFill>
+          <a:ln>
+            <a:noFill/>
+          </a:ln>
         </p:spPr>
-        <p:txBody>
-          <a:bodyPr anchor="b"/>
+        <p:style>
+          <a:lnRef idx="2">
+            <a:schemeClr val="accent1">
+              <a:shade val="50000"/>
+            </a:schemeClr>
+          </a:lnRef>
+          <a:fillRef idx="1">
+            <a:schemeClr val="accent1"/>
+          </a:fillRef>
+          <a:effectRef idx="0">
+            <a:schemeClr val="accent1"/>
+          </a:effectRef>
+          <a:fontRef idx="minor">
+            <a:schemeClr val="lt1"/>
+          </a:fontRef>
+        </p:style>
+      </p:sp>
+      <p:sp>
+        <p:nvSpPr>
+          <p:cNvPr id="2" name="Title 1"/>
+          <p:cNvSpPr>
+            <a:spLocks noGrp="1"/>
+          </p:cNvSpPr>
+          <p:nvPr>
+            <p:ph type="title"/>
+          </p:nvPr>
+        </p:nvSpPr>
+        <p:spPr bwMode="blackWhite">
+          <a:xfrm>
+            <a:off x="606392" y="1682871"/>
+            <a:ext cx="3371249" cy="850980"/>
+          </a:xfrm>
+          <a:solidFill>
+            <a:srgbClr val="FFFFFF"/>
+          </a:solidFill>
+          <a:ln>
+            <a:solidFill>
+              <a:srgbClr val="404040"/>
+            </a:solidFill>
+          </a:ln>
+        </p:spPr>
+        <p:txBody>
+          <a:bodyPr anchor="ctr" anchorCtr="1">
+            <a:noAutofit/>
+          </a:bodyPr>
           <a:lstStyle>
-            <a:lvl1pPr algn="l">
-              <a:defRPr sz="1500" b="1"/>
+            <a:lvl1pPr>
+              <a:defRPr sz="1650">
+                <a:solidFill>
+                  <a:srgbClr val="262626"/>
+                </a:solidFill>
+              </a:defRPr>
             </a:lvl1pPr>
           </a:lstStyle>
           <a:p>
@@ -2803,6 +2878,7 @@
               <a:rPr lang="en-US"/>
               <a:t>Click to edit Master title style</a:t>
             </a:r>
+            <a:endParaRPr lang="en-US" dirty="0"/>
           </a:p>
         </p:txBody>
       </p:sp>
@@ -2810,7 +2886,7 @@
         <p:nvSpPr>
           <p:cNvPr id="3" name="Picture Placeholder 2"/>
           <p:cNvSpPr>
-            <a:spLocks noGrp="1"/>
+            <a:spLocks noGrp="1" noChangeAspect="1"/>
           </p:cNvSpPr>
           <p:nvPr>
             <p:ph type="pic" idx="1"/>
@@ -2818,16 +2894,28 @@
         </p:nvSpPr>
         <p:spPr>
           <a:xfrm>
-            <a:off x="1792288" y="459581"/>
-            <a:ext cx="5486400" cy="3086100"/>
+            <a:off x="4572000" y="0"/>
+            <a:ext cx="4576573" cy="5143500"/>
           </a:xfrm>
+          <a:solidFill>
+            <a:schemeClr val="bg1">
+              <a:lumMod val="75000"/>
+            </a:schemeClr>
+          </a:solidFill>
         </p:spPr>
         <p:txBody>
-          <a:bodyPr/>
+          <a:bodyPr anchor="t"/>
           <a:lstStyle>
             <a:lvl1pPr marL="0" indent="0">
               <a:buNone/>
-              <a:defRPr sz="2400"/>
+              <a:defRPr sz="2400">
+                <a:solidFill>
+                  <a:schemeClr val="bg1">
+                    <a:lumMod val="85000"/>
+                    <a:lumOff val="15000"/>
+                  </a:schemeClr>
+                </a:solidFill>
+              </a:defRPr>
             </a:lvl1pPr>
             <a:lvl2pPr marL="342900" indent="0">
               <a:buNone/>
@@ -2863,7 +2951,11 @@
             </a:lvl9pPr>
           </a:lstStyle>
           <a:p>
-            <a:endParaRPr lang="en-US"/>
+            <a:r>
+              <a:rPr lang="en-US"/>
+              <a:t>Click icon to add picture</a:t>
+            </a:r>
+            <a:endParaRPr lang="en-US" dirty="0"/>
           </a:p>
         </p:txBody>
       </p:sp>
@@ -2879,77 +2971,98 @@
         </p:nvSpPr>
         <p:spPr>
           <a:xfrm>
-            <a:off x="1792288" y="4025503"/>
-            <a:ext cx="5486400" cy="603647"/>
+            <a:off x="836676" y="2662439"/>
+            <a:ext cx="2846070" cy="1645528"/>
           </a:xfrm>
         </p:spPr>
         <p:txBody>
+          <a:bodyPr anchor="t" anchorCtr="1">
+            <a:normAutofit/>
+          </a:bodyPr>
+          <a:lstStyle>
+            <a:lvl1pPr marL="0" indent="0" algn="ctr">
+              <a:buNone/>
+              <a:defRPr sz="1125">
+                <a:solidFill>
+                  <a:srgbClr val="FFFFFF"/>
+                </a:solidFill>
+              </a:defRPr>
+            </a:lvl1pPr>
+            <a:lvl2pPr marL="342900" indent="0">
+              <a:buNone/>
+              <a:defRPr sz="1050"/>
+            </a:lvl2pPr>
+            <a:lvl3pPr marL="685800" indent="0">
+              <a:buNone/>
+              <a:defRPr sz="900"/>
+            </a:lvl3pPr>
+            <a:lvl4pPr marL="1028700" indent="0">
+              <a:buNone/>
+              <a:defRPr sz="750"/>
+            </a:lvl4pPr>
+            <a:lvl5pPr marL="1371600" indent="0">
+              <a:buNone/>
+              <a:defRPr sz="750"/>
+            </a:lvl5pPr>
+            <a:lvl6pPr marL="1714500" indent="0">
+              <a:buNone/>
+              <a:defRPr sz="750"/>
+            </a:lvl6pPr>
+            <a:lvl7pPr marL="2057400" indent="0">
+              <a:buNone/>
+              <a:defRPr sz="750"/>
+            </a:lvl7pPr>
+            <a:lvl8pPr marL="2400300" indent="0">
+              <a:buNone/>
+              <a:defRPr sz="750"/>
+            </a:lvl8pPr>
+            <a:lvl9pPr marL="2743200" indent="0">
+              <a:buNone/>
+              <a:defRPr sz="750"/>
+            </a:lvl9pPr>
+          </a:lstStyle>
+          <a:p>
+            <a:pPr lvl="0"/>
+            <a:r>
+              <a:rPr lang="en-US"/>
+              <a:t>Click to edit Master text styles</a:t>
+            </a:r>
+          </a:p>
+        </p:txBody>
+      </p:sp>
+      <p:sp>
+        <p:nvSpPr>
+          <p:cNvPr id="8" name="Date Placeholder 7"/>
+          <p:cNvSpPr>
+            <a:spLocks noGrp="1"/>
+          </p:cNvSpPr>
+          <p:nvPr>
+            <p:ph type="dt" sz="half" idx="10"/>
+          </p:nvPr>
+        </p:nvSpPr>
+        <p:spPr/>
+        <p:txBody>
           <a:bodyPr/>
           <a:lstStyle>
-            <a:lvl1pPr marL="0" indent="0">
-              <a:buNone/>
-              <a:defRPr sz="1050"/>
+            <a:lvl1pPr>
+              <a:defRPr>
+                <a:solidFill>
+                  <a:srgbClr val="FFFFFF"/>
+                </a:solidFill>
+                <a:effectLst>
+                  <a:outerShdw blurRad="50800" dist="38100" dir="2700000" algn="tl" rotWithShape="0">
+                    <a:prstClr val="black">
+                      <a:alpha val="43000"/>
+                    </a:prstClr>
+                  </a:outerShdw>
+                </a:effectLst>
+              </a:defRPr>
             </a:lvl1pPr>
-            <a:lvl2pPr marL="342900" indent="0">
-              <a:buNone/>
-              <a:defRPr sz="900"/>
-            </a:lvl2pPr>
-            <a:lvl3pPr marL="685800" indent="0">
-              <a:buNone/>
-              <a:defRPr sz="750"/>
-            </a:lvl3pPr>
-            <a:lvl4pPr marL="1028700" indent="0">
-              <a:buNone/>
-              <a:defRPr sz="675"/>
-            </a:lvl4pPr>
-            <a:lvl5pPr marL="1371600" indent="0">
-              <a:buNone/>
-              <a:defRPr sz="675"/>
-            </a:lvl5pPr>
-            <a:lvl6pPr marL="1714500" indent="0">
-              <a:buNone/>
-              <a:defRPr sz="675"/>
-            </a:lvl6pPr>
-            <a:lvl7pPr marL="2057400" indent="0">
-              <a:buNone/>
-              <a:defRPr sz="675"/>
-            </a:lvl7pPr>
-            <a:lvl8pPr marL="2400300" indent="0">
-              <a:buNone/>
-              <a:defRPr sz="675"/>
-            </a:lvl8pPr>
-            <a:lvl9pPr marL="2743200" indent="0">
-              <a:buNone/>
-              <a:defRPr sz="675"/>
-            </a:lvl9pPr>
           </a:lstStyle>
-          <a:p>
-            <a:pPr lvl="0"/>
-            <a:r>
-              <a:rPr lang="en-US"/>
-              <a:t>Click to edit Master text styles</a:t>
-            </a:r>
-          </a:p>
-        </p:txBody>
-      </p:sp>
-      <p:sp>
-        <p:nvSpPr>
-          <p:cNvPr id="5" name="Date Placeholder 4"/>
-          <p:cNvSpPr>
-            <a:spLocks noGrp="1"/>
-          </p:cNvSpPr>
-          <p:nvPr>
-            <p:ph type="dt" sz="half" idx="10"/>
-          </p:nvPr>
-        </p:nvSpPr>
-        <p:spPr/>
-        <p:txBody>
-          <a:bodyPr/>
-          <a:lstStyle/>
           <a:p>
             <a:fld id="{241EB5C9-1307-BA42-ABA2-0BC069CD8E7F}" type="datetimeFigureOut">
               <a:rPr lang="en-US" smtClean="0"/>
-              <a:t>1/2/22</a:t>
+              <a:t>27-Apr-23</a:t>
             </a:fld>
             <a:endParaRPr lang="en-US"/>
           </a:p>
@@ -2957,7 +3070,7 @@
       </p:sp>
       <p:sp>
         <p:nvSpPr>
-          <p:cNvPr id="6" name="Footer Placeholder 5"/>
+          <p:cNvPr id="9" name="Footer Placeholder 8"/>
           <p:cNvSpPr>
             <a:spLocks noGrp="1"/>
           </p:cNvSpPr>
@@ -2965,10 +3078,25 @@
             <p:ph type="ftr" sz="quarter" idx="11"/>
           </p:nvPr>
         </p:nvSpPr>
-        <p:spPr/>
+        <p:spPr>
+          <a:xfrm>
+            <a:off x="603504" y="4677156"/>
+            <a:ext cx="3843598" cy="240030"/>
+          </a:xfrm>
+        </p:spPr>
         <p:txBody>
           <a:bodyPr/>
-          <a:lstStyle/>
+          <a:lstStyle>
+            <a:lvl1pPr>
+              <a:defRPr>
+                <a:solidFill>
+                  <a:srgbClr val="FFFFFF">
+                    <a:alpha val="70000"/>
+                  </a:srgbClr>
+                </a:solidFill>
+              </a:defRPr>
+            </a:lvl1pPr>
+          </a:lstStyle>
           <a:p>
             <a:endParaRPr lang="en-US"/>
           </a:p>
@@ -2976,7 +3104,7 @@
       </p:sp>
       <p:sp>
         <p:nvSpPr>
-          <p:cNvPr id="7" name="Slide Number Placeholder 6"/>
+          <p:cNvPr id="10" name="Slide Number Placeholder 9"/>
           <p:cNvSpPr>
             <a:spLocks noGrp="1"/>
           </p:cNvSpPr>
@@ -3000,7 +3128,7 @@
     </p:spTree>
     <p:extLst>
       <p:ext uri="{BB962C8B-B14F-4D97-AF65-F5344CB8AC3E}">
-        <p14:creationId xmlns:p14="http://schemas.microsoft.com/office/powerpoint/2010/main" val="3566899855"/>
+        <p14:creationId xmlns:p14="http://schemas.microsoft.com/office/powerpoint/2010/main" val="3551777416"/>
       </p:ext>
     </p:extLst>
   </p:cSld>
@@ -3011,12 +3139,17 @@
 </file>
 
 <file path=ppt/slideMasters/slideMaster1.xml><?xml version="1.0" encoding="utf-8"?>
-<p:sldMaster xmlns:a="http://schemas.openxmlformats.org/drawingml/2006/main" xmlns:p="http://schemas.openxmlformats.org/presentationml/2006/main" xmlns:r="http://schemas.openxmlformats.org/officeDocument/2006/relationships">
+<p:sldMaster xmlns:a="http://schemas.openxmlformats.org/drawingml/2006/main" xmlns:r="http://schemas.openxmlformats.org/officeDocument/2006/relationships" xmlns:p="http://schemas.openxmlformats.org/presentationml/2006/main">
   <p:cSld>
     <p:bg>
-      <p:bgRef idx="1001">
-        <a:schemeClr val="bg1"/>
-      </p:bgRef>
+      <p:bgPr>
+        <a:solidFill>
+          <a:schemeClr val="bg1">
+            <a:lumMod val="95000"/>
+          </a:schemeClr>
+        </a:solidFill>
+        <a:effectLst/>
+      </p:bgPr>
     </p:bg>
     <p:spTree>
       <p:nvGrpSpPr>
@@ -3042,195 +3175,211 @@
             <p:ph type="title"/>
           </p:nvPr>
         </p:nvSpPr>
+        <p:spPr bwMode="black">
+          <a:xfrm>
+            <a:off x="1673352" y="723519"/>
+            <a:ext cx="5797296" cy="891540"/>
+          </a:xfrm>
+          <a:prstGeom prst="rect">
+            <a:avLst/>
+          </a:prstGeom>
+          <a:solidFill>
+            <a:srgbClr val="FFFFFF"/>
+          </a:solidFill>
+          <a:ln w="31750" cap="sq">
+            <a:solidFill>
+              <a:srgbClr val="404040"/>
+            </a:solidFill>
+            <a:miter lim="800000"/>
+          </a:ln>
+        </p:spPr>
+        <p:txBody>
+          <a:bodyPr vert="horz" lIns="182880" tIns="182880" rIns="182880" bIns="182880" rtlCol="0" anchor="ctr">
+            <a:normAutofit/>
+          </a:bodyPr>
+          <a:lstStyle/>
+          <a:p>
+            <a:r>
+              <a:rPr lang="en-US"/>
+              <a:t>Click to edit Master title style</a:t>
+            </a:r>
+            <a:endParaRPr lang="en-US" dirty="0"/>
+          </a:p>
+        </p:txBody>
+      </p:sp>
+      <p:sp>
+        <p:nvSpPr>
+          <p:cNvPr id="3" name="Text Placeholder 2"/>
+          <p:cNvSpPr>
+            <a:spLocks noGrp="1"/>
+          </p:cNvSpPr>
+          <p:nvPr>
+            <p:ph type="body" idx="1"/>
+          </p:nvPr>
+        </p:nvSpPr>
         <p:spPr>
           <a:xfrm>
-            <a:off x="457200" y="205979"/>
-            <a:ext cx="8229600" cy="857250"/>
+            <a:off x="1673352" y="1978534"/>
+            <a:ext cx="5797296" cy="2326487"/>
           </a:xfrm>
           <a:prstGeom prst="rect">
             <a:avLst/>
           </a:prstGeom>
         </p:spPr>
         <p:txBody>
-          <a:bodyPr anchor="ctr" bIns="45720" lIns="91440" rIns="91440" rtlCol="0" tIns="45720" vert="horz">
+          <a:bodyPr vert="horz" lIns="91440" tIns="45720" rIns="91440" bIns="45720" rtlCol="0">
             <a:normAutofit/>
           </a:bodyPr>
           <a:lstStyle/>
           <a:p>
-            <a:r>
-              <a:rPr lang="en-US"/>
-              <a:t>Click to edit Master title style</a:t>
-            </a:r>
-          </a:p>
-        </p:txBody>
-      </p:sp>
-      <p:sp>
-        <p:nvSpPr>
-          <p:cNvPr id="3" name="Text Placeholder 2"/>
-          <p:cNvSpPr>
-            <a:spLocks noGrp="1"/>
-          </p:cNvSpPr>
-          <p:nvPr>
-            <p:ph idx="1" type="body"/>
+            <a:pPr lvl="0"/>
+            <a:r>
+              <a:rPr lang="en-US"/>
+              <a:t>Click to edit Master text styles</a:t>
+            </a:r>
+          </a:p>
+          <a:p>
+            <a:pPr lvl="1"/>
+            <a:r>
+              <a:rPr lang="en-US"/>
+              <a:t>Second level</a:t>
+            </a:r>
+          </a:p>
+          <a:p>
+            <a:pPr lvl="2"/>
+            <a:r>
+              <a:rPr lang="en-US"/>
+              <a:t>Third level</a:t>
+            </a:r>
+          </a:p>
+          <a:p>
+            <a:pPr lvl="3"/>
+            <a:r>
+              <a:rPr lang="en-US"/>
+              <a:t>Fourth level</a:t>
+            </a:r>
+          </a:p>
+          <a:p>
+            <a:pPr lvl="4"/>
+            <a:r>
+              <a:rPr lang="en-US"/>
+              <a:t>Fifth level</a:t>
+            </a:r>
+            <a:endParaRPr lang="en-US" dirty="0"/>
+          </a:p>
+        </p:txBody>
+      </p:sp>
+      <p:sp>
+        <p:nvSpPr>
+          <p:cNvPr id="4" name="Date Placeholder 3"/>
+          <p:cNvSpPr>
+            <a:spLocks noGrp="1"/>
+          </p:cNvSpPr>
+          <p:nvPr>
+            <p:ph type="dt" sz="half" idx="2"/>
           </p:nvPr>
         </p:nvSpPr>
         <p:spPr>
           <a:xfrm>
-            <a:off x="457200" y="1200151"/>
-            <a:ext cx="8229600" cy="3394472"/>
+            <a:off x="5866072" y="4679112"/>
+            <a:ext cx="2065310" cy="242976"/>
           </a:xfrm>
           <a:prstGeom prst="rect">
             <a:avLst/>
           </a:prstGeom>
         </p:spPr>
         <p:txBody>
-          <a:bodyPr bIns="45720" lIns="91440" rIns="91440" rtlCol="0" tIns="45720" vert="horz">
-            <a:normAutofit/>
-          </a:bodyPr>
-          <a:lstStyle/>
-          <a:p>
-            <a:pPr lvl="0"/>
-            <a:r>
-              <a:rPr lang="en-US"/>
-              <a:t>Click to edit Master text styles</a:t>
-            </a:r>
-          </a:p>
-          <a:p>
-            <a:pPr lvl="1"/>
-            <a:r>
-              <a:rPr lang="en-US"/>
-              <a:t>Second level</a:t>
-            </a:r>
-          </a:p>
-          <a:p>
-            <a:pPr lvl="2"/>
-            <a:r>
-              <a:rPr lang="en-US"/>
-              <a:t>Third level</a:t>
-            </a:r>
-          </a:p>
-          <a:p>
-            <a:pPr lvl="3"/>
-            <a:r>
-              <a:rPr lang="en-US"/>
-              <a:t>Fourth level</a:t>
-            </a:r>
-          </a:p>
-          <a:p>
-            <a:pPr lvl="4"/>
-            <a:r>
-              <a:rPr lang="en-US"/>
-              <a:t>Fifth level</a:t>
-            </a:r>
-          </a:p>
-        </p:txBody>
-      </p:sp>
-      <p:sp>
-        <p:nvSpPr>
-          <p:cNvPr id="4" name="Date Placeholder 3"/>
-          <p:cNvSpPr>
-            <a:spLocks noGrp="1"/>
-          </p:cNvSpPr>
-          <p:nvPr>
-            <p:ph idx="2" sz="half" type="dt"/>
+          <a:bodyPr vert="horz" lIns="91440" tIns="45720" rIns="91440" bIns="45720" rtlCol="0" anchor="ctr"/>
+          <a:lstStyle>
+            <a:lvl1pPr algn="r">
+              <a:defRPr sz="788">
+                <a:solidFill>
+                  <a:schemeClr val="tx1">
+                    <a:alpha val="70000"/>
+                  </a:schemeClr>
+                </a:solidFill>
+              </a:defRPr>
+            </a:lvl1pPr>
+          </a:lstStyle>
+          <a:p>
+            <a:fld id="{241EB5C9-1307-BA42-ABA2-0BC069CD8E7F}" type="datetimeFigureOut">
+              <a:rPr lang="en-US" smtClean="0"/>
+              <a:t>27-Apr-23</a:t>
+            </a:fld>
+            <a:endParaRPr lang="en-US"/>
+          </a:p>
+        </p:txBody>
+      </p:sp>
+      <p:sp>
+        <p:nvSpPr>
+          <p:cNvPr id="5" name="Footer Placeholder 4"/>
+          <p:cNvSpPr>
+            <a:spLocks noGrp="1"/>
+          </p:cNvSpPr>
+          <p:nvPr>
+            <p:ph type="ftr" sz="quarter" idx="3"/>
           </p:nvPr>
         </p:nvSpPr>
         <p:spPr>
           <a:xfrm>
-            <a:off x="457200" y="4767263"/>
-            <a:ext cx="2133600" cy="273844"/>
+            <a:off x="1200150" y="4677156"/>
+            <a:ext cx="4425892" cy="240030"/>
           </a:xfrm>
           <a:prstGeom prst="rect">
             <a:avLst/>
           </a:prstGeom>
         </p:spPr>
         <p:txBody>
-          <a:bodyPr anchor="ctr" bIns="45720" lIns="91440" rIns="91440" rtlCol="0" tIns="45720" vert="horz"/>
+          <a:bodyPr vert="horz" lIns="91440" tIns="45720" rIns="91440" bIns="45720" rtlCol="0" anchor="ctr"/>
           <a:lstStyle>
             <a:lvl1pPr algn="l">
-              <a:defRPr sz="900">
+              <a:defRPr sz="788">
                 <a:solidFill>
                   <a:schemeClr val="tx1">
-                    <a:tint val="75000"/>
+                    <a:alpha val="70000"/>
                   </a:schemeClr>
                 </a:solidFill>
               </a:defRPr>
             </a:lvl1pPr>
           </a:lstStyle>
           <a:p>
-            <a:fld id="{241EB5C9-1307-BA42-ABA2-0BC069CD8E7F}" type="datetimeFigureOut">
-              <a:rPr lang="en-US" smtClean="0"/>
-              <a:t>1/2/22</a:t>
-            </a:fld>
             <a:endParaRPr lang="en-US"/>
           </a:p>
         </p:txBody>
       </p:sp>
       <p:sp>
         <p:nvSpPr>
-          <p:cNvPr id="5" name="Footer Placeholder 4"/>
-          <p:cNvSpPr>
-            <a:spLocks noGrp="1"/>
-          </p:cNvSpPr>
-          <p:nvPr>
-            <p:ph idx="3" sz="quarter" type="ftr"/>
+          <p:cNvPr id="6" name="Slide Number Placeholder 5"/>
+          <p:cNvSpPr>
+            <a:spLocks noGrp="1"/>
+          </p:cNvSpPr>
+          <p:nvPr>
+            <p:ph type="sldNum" sz="quarter" idx="4"/>
           </p:nvPr>
         </p:nvSpPr>
         <p:spPr>
           <a:xfrm>
-            <a:off x="3124200" y="4767263"/>
-            <a:ext cx="2895600" cy="273844"/>
+            <a:off x="8069192" y="4663440"/>
+            <a:ext cx="274320" cy="274320"/>
           </a:xfrm>
-          <a:prstGeom prst="rect">
+          <a:prstGeom prst="ellipse">
             <a:avLst/>
           </a:prstGeom>
+          <a:solidFill>
+            <a:srgbClr val="1D1D1D">
+              <a:alpha val="70000"/>
+            </a:srgbClr>
+          </a:solidFill>
         </p:spPr>
         <p:txBody>
-          <a:bodyPr anchor="ctr" bIns="45720" lIns="91440" rIns="91440" rtlCol="0" tIns="45720" vert="horz"/>
+          <a:bodyPr vert="horz" lIns="18288" tIns="45720" rIns="18288" bIns="45720" rtlCol="0" anchor="ctr">
+            <a:noAutofit/>
+          </a:bodyPr>
           <a:lstStyle>
             <a:lvl1pPr algn="ctr">
-              <a:defRPr sz="900">
+              <a:defRPr sz="825" spc="0" baseline="0">
                 <a:solidFill>
-                  <a:schemeClr val="tx1">
-                    <a:tint val="75000"/>
-                  </a:schemeClr>
-                </a:solidFill>
-              </a:defRPr>
-            </a:lvl1pPr>
-          </a:lstStyle>
-          <a:p>
-            <a:endParaRPr lang="en-US"/>
-          </a:p>
-        </p:txBody>
-      </p:sp>
-      <p:sp>
-        <p:nvSpPr>
-          <p:cNvPr id="6" name="Slide Number Placeholder 5"/>
-          <p:cNvSpPr>
-            <a:spLocks noGrp="1"/>
-          </p:cNvSpPr>
-          <p:nvPr>
-            <p:ph idx="4" sz="quarter" type="sldNum"/>
-          </p:nvPr>
-        </p:nvSpPr>
-        <p:spPr>
-          <a:xfrm>
-            <a:off x="6553200" y="4767263"/>
-            <a:ext cx="2133600" cy="273844"/>
-          </a:xfrm>
-          <a:prstGeom prst="rect">
-            <a:avLst/>
-          </a:prstGeom>
-        </p:spPr>
-        <p:txBody>
-          <a:bodyPr anchor="ctr" bIns="45720" lIns="91440" rIns="91440" rtlCol="0" tIns="45720" vert="horz"/>
-          <a:lstStyle>
-            <a:lvl1pPr algn="r">
-              <a:defRPr sz="900">
-                <a:solidFill>
-                  <a:schemeClr val="tx1">
-                    <a:tint val="75000"/>
-                  </a:schemeClr>
+                  <a:srgbClr val="FFFFFF"/>
                 </a:solidFill>
               </a:defRPr>
             </a:lvl1pPr>
@@ -3247,34 +3396,37 @@
     </p:spTree>
     <p:extLst>
       <p:ext uri="{BB962C8B-B14F-4D97-AF65-F5344CB8AC3E}">
-        <p14:creationId xmlns:p14="http://schemas.microsoft.com/office/powerpoint/2010/main" val="3676200875"/>
+        <p14:creationId xmlns:p14="http://schemas.microsoft.com/office/powerpoint/2010/main" val="2437661843"/>
       </p:ext>
     </p:extLst>
   </p:cSld>
-  <p:clrMap accent1="accent1" accent2="accent2" accent3="accent3" accent4="accent4" accent5="accent5" accent6="accent6" bg1="lt1" bg2="lt2" folHlink="folHlink" hlink="hlink" tx1="dk1" tx2="dk2"/>
+  <p:clrMap bg1="lt1" tx1="dk1" bg2="lt2" tx2="dk2" accent1="accent1" accent2="accent2" accent3="accent3" accent4="accent4" accent5="accent5" accent6="accent6" hlink="hlink" folHlink="folHlink"/>
   <p:sldLayoutIdLst>
-    <p:sldLayoutId id="2147483649" r:id="rId1"/>
-    <p:sldLayoutId id="2147483650" r:id="rId2"/>
-    <p:sldLayoutId id="2147483651" r:id="rId3"/>
-    <p:sldLayoutId id="2147483652" r:id="rId4"/>
-    <p:sldLayoutId id="2147483653" r:id="rId5"/>
-    <p:sldLayoutId id="2147483654" r:id="rId6"/>
-    <p:sldLayoutId id="2147483655" r:id="rId7"/>
-    <p:sldLayoutId id="2147483656" r:id="rId8"/>
-    <p:sldLayoutId id="2147483657" r:id="rId9"/>
-    <p:sldLayoutId id="2147483658" r:id="rId10"/>
-    <p:sldLayoutId id="2147483659" r:id="rId11"/>
+    <p:sldLayoutId id="2147483661" r:id="rId1"/>
+    <p:sldLayoutId id="2147483662" r:id="rId2"/>
+    <p:sldLayoutId id="2147483663" r:id="rId3"/>
+    <p:sldLayoutId id="2147483664" r:id="rId4"/>
+    <p:sldLayoutId id="2147483665" r:id="rId5"/>
+    <p:sldLayoutId id="2147483666" r:id="rId6"/>
+    <p:sldLayoutId id="2147483667" r:id="rId7"/>
+    <p:sldLayoutId id="2147483668" r:id="rId8"/>
+    <p:sldLayoutId id="2147483669" r:id="rId9"/>
+    <p:sldLayoutId id="2147483670" r:id="rId10"/>
+    <p:sldLayoutId id="2147483671" r:id="rId11"/>
   </p:sldLayoutIdLst>
   <p:txStyles>
     <p:titleStyle>
-      <a:lvl1pPr algn="ctr" defTabSz="342900" eaLnBrk="1" hangingPunct="1" latinLnBrk="0" rtl="0">
+      <a:lvl1pPr algn="ctr" defTabSz="685800" rtl="0" eaLnBrk="1" latinLnBrk="0" hangingPunct="1">
+        <a:lnSpc>
+          <a:spcPct val="90000"/>
+        </a:lnSpc>
         <a:spcBef>
           <a:spcPct val="0"/>
         </a:spcBef>
         <a:buNone/>
-        <a:defRPr kern="1200" sz="3300">
+        <a:defRPr sz="2100" kern="1200" cap="all" spc="150" baseline="0">
           <a:solidFill>
-            <a:schemeClr val="tx1"/>
+            <a:srgbClr val="262626"/>
           </a:solidFill>
           <a:latin typeface="+mj-lt"/>
           <a:ea typeface="+mj-ea"/>
@@ -3283,88 +3435,139 @@
       </a:lvl1pPr>
     </p:titleStyle>
     <p:bodyStyle>
-      <a:lvl1pPr algn="l" defTabSz="342900" eaLnBrk="1" hangingPunct="1" indent="-342900" latinLnBrk="0" marL="342900" rtl="0">
+      <a:lvl1pPr marL="171450" indent="-171450" algn="l" defTabSz="685800" rtl="0" eaLnBrk="1" latinLnBrk="0" hangingPunct="1">
+        <a:lnSpc>
+          <a:spcPct val="100000"/>
+        </a:lnSpc>
         <a:spcBef>
-          <a:spcPct val="20000"/>
+          <a:spcPts val="750"/>
         </a:spcBef>
-        <a:buFont typeface="Arial"/>
+        <a:buClr>
+          <a:schemeClr val="accent2"/>
+        </a:buClr>
+        <a:buFont typeface="Arial" panose="020B0604020202020204" pitchFamily="34" charset="0"/>
         <a:buChar char="•"/>
-        <a:defRPr kern="1200" sz="2400">
+        <a:defRPr sz="1350" kern="1200">
           <a:solidFill>
-            <a:schemeClr val="tx1"/>
+            <a:schemeClr val="tx1">
+              <a:lumMod val="85000"/>
+              <a:lumOff val="15000"/>
+            </a:schemeClr>
           </a:solidFill>
           <a:latin typeface="+mn-lt"/>
           <a:ea typeface="+mn-ea"/>
           <a:cs typeface="+mn-cs"/>
         </a:defRPr>
       </a:lvl1pPr>
-      <a:lvl2pPr algn="l" defTabSz="342900" eaLnBrk="1" hangingPunct="1" indent="-342900" latinLnBrk="0" marL="685800" rtl="0">
+      <a:lvl2pPr marL="342900" indent="-171450" algn="l" defTabSz="685800" rtl="0" eaLnBrk="1" latinLnBrk="0" hangingPunct="1">
+        <a:lnSpc>
+          <a:spcPct val="100000"/>
+        </a:lnSpc>
         <a:spcBef>
-          <a:spcPct val="20000"/>
+          <a:spcPts val="750"/>
         </a:spcBef>
-        <a:buFont typeface="Arial"/>
-        <a:buChar char="–"/>
-        <a:defRPr kern="1200" sz="2100">
+        <a:buClr>
+          <a:schemeClr val="accent2"/>
+        </a:buClr>
+        <a:buFont typeface="Arial" panose="020B0604020202020204" pitchFamily="34" charset="0"/>
+        <a:buChar char="•"/>
+        <a:defRPr sz="1200" kern="1200">
           <a:solidFill>
-            <a:schemeClr val="tx1"/>
+            <a:schemeClr val="tx1">
+              <a:lumMod val="85000"/>
+              <a:lumOff val="15000"/>
+            </a:schemeClr>
           </a:solidFill>
           <a:latin typeface="+mn-lt"/>
           <a:ea typeface="+mn-ea"/>
           <a:cs typeface="+mn-cs"/>
         </a:defRPr>
       </a:lvl2pPr>
-      <a:lvl3pPr algn="l" defTabSz="342900" eaLnBrk="1" hangingPunct="1" indent="-342900" latinLnBrk="0" marL="1028700" rtl="0">
+      <a:lvl3pPr marL="514350" indent="-171450" algn="l" defTabSz="685800" rtl="0" eaLnBrk="1" latinLnBrk="0" hangingPunct="1">
+        <a:lnSpc>
+          <a:spcPct val="100000"/>
+        </a:lnSpc>
         <a:spcBef>
-          <a:spcPct val="20000"/>
+          <a:spcPts val="750"/>
         </a:spcBef>
-        <a:buFont typeface="Arial"/>
+        <a:buClr>
+          <a:schemeClr val="accent2"/>
+        </a:buClr>
+        <a:buFont typeface="Arial" panose="020B0604020202020204" pitchFamily="34" charset="0"/>
         <a:buChar char="•"/>
-        <a:defRPr kern="1200" sz="1800">
+        <a:defRPr sz="1200" kern="1200">
           <a:solidFill>
-            <a:schemeClr val="tx1"/>
+            <a:schemeClr val="tx1">
+              <a:lumMod val="85000"/>
+              <a:lumOff val="15000"/>
+            </a:schemeClr>
           </a:solidFill>
           <a:latin typeface="+mn-lt"/>
           <a:ea typeface="+mn-ea"/>
           <a:cs typeface="+mn-cs"/>
         </a:defRPr>
       </a:lvl3pPr>
-      <a:lvl4pPr algn="l" defTabSz="342900" eaLnBrk="1" hangingPunct="1" indent="-342900" latinLnBrk="0" marL="1371600" rtl="0">
+      <a:lvl4pPr marL="685800" indent="-171450" algn="l" defTabSz="685800" rtl="0" eaLnBrk="1" latinLnBrk="0" hangingPunct="1">
+        <a:lnSpc>
+          <a:spcPct val="100000"/>
+        </a:lnSpc>
         <a:spcBef>
-          <a:spcPct val="20000"/>
+          <a:spcPts val="750"/>
         </a:spcBef>
-        <a:buFont typeface="Arial"/>
-        <a:buChar char="–"/>
-        <a:defRPr kern="1200" sz="1500">
+        <a:buClr>
+          <a:schemeClr val="accent2"/>
+        </a:buClr>
+        <a:buFont typeface="Arial" panose="020B0604020202020204" pitchFamily="34" charset="0"/>
+        <a:buChar char="•"/>
+        <a:defRPr sz="1200" kern="1200">
           <a:solidFill>
-            <a:schemeClr val="tx1"/>
+            <a:schemeClr val="tx1">
+              <a:lumMod val="85000"/>
+              <a:lumOff val="15000"/>
+            </a:schemeClr>
           </a:solidFill>
           <a:latin typeface="+mn-lt"/>
           <a:ea typeface="+mn-ea"/>
           <a:cs typeface="+mn-cs"/>
         </a:defRPr>
       </a:lvl4pPr>
-      <a:lvl5pPr algn="l" defTabSz="342900" eaLnBrk="1" hangingPunct="1" indent="-342900" latinLnBrk="0" marL="1714500" rtl="0">
+      <a:lvl5pPr marL="857250" indent="-171450" algn="l" defTabSz="685800" rtl="0" eaLnBrk="1" latinLnBrk="0" hangingPunct="1">
+        <a:lnSpc>
+          <a:spcPct val="100000"/>
+        </a:lnSpc>
         <a:spcBef>
-          <a:spcPct val="20000"/>
+          <a:spcPts val="750"/>
         </a:spcBef>
-        <a:buFont typeface="Arial"/>
-        <a:buChar char="»"/>
-        <a:defRPr kern="1200" sz="1500">
+        <a:buClr>
+          <a:schemeClr val="accent2"/>
+        </a:buClr>
+        <a:buFont typeface="Arial" panose="020B0604020202020204" pitchFamily="34" charset="0"/>
+        <a:buChar char="•"/>
+        <a:defRPr sz="1200" kern="1200">
           <a:solidFill>
-            <a:schemeClr val="tx1"/>
+            <a:schemeClr val="tx1">
+              <a:lumMod val="85000"/>
+              <a:lumOff val="15000"/>
+            </a:schemeClr>
           </a:solidFill>
           <a:latin typeface="+mn-lt"/>
           <a:ea typeface="+mn-ea"/>
           <a:cs typeface="+mn-cs"/>
         </a:defRPr>
       </a:lvl5pPr>
-      <a:lvl6pPr algn="l" defTabSz="342900" eaLnBrk="1" hangingPunct="1" indent="-342900" latinLnBrk="0" marL="2057400" rtl="0">
+      <a:lvl6pPr marL="984647" indent="-171450" algn="l" defTabSz="685800" rtl="0" eaLnBrk="1" latinLnBrk="0" hangingPunct="1">
+        <a:lnSpc>
+          <a:spcPct val="100000"/>
+        </a:lnSpc>
         <a:spcBef>
-          <a:spcPct val="20000"/>
+          <a:spcPts val="750"/>
         </a:spcBef>
-        <a:buFont typeface="Arial"/>
+        <a:buClr>
+          <a:schemeClr val="accent2"/>
+        </a:buClr>
+        <a:buFont typeface="Arial" panose="020B0604020202020204" pitchFamily="34" charset="0"/>
         <a:buChar char="•"/>
-        <a:defRPr kern="1200" sz="1500">
+        <a:defRPr sz="1200" kern="1200">
           <a:solidFill>
             <a:schemeClr val="tx1"/>
           </a:solidFill>
@@ -3373,13 +3576,19 @@
           <a:cs typeface="+mn-cs"/>
         </a:defRPr>
       </a:lvl6pPr>
-      <a:lvl7pPr algn="l" defTabSz="342900" eaLnBrk="1" hangingPunct="1" indent="-342900" latinLnBrk="0" marL="2400300" rtl="0">
+      <a:lvl7pPr marL="1113235" indent="-171450" algn="l" defTabSz="685800" rtl="0" eaLnBrk="1" latinLnBrk="0" hangingPunct="1">
+        <a:lnSpc>
+          <a:spcPct val="100000"/>
+        </a:lnSpc>
         <a:spcBef>
-          <a:spcPct val="20000"/>
+          <a:spcPts val="750"/>
         </a:spcBef>
-        <a:buFont typeface="Arial"/>
+        <a:buClr>
+          <a:schemeClr val="accent2"/>
+        </a:buClr>
+        <a:buFont typeface="Arial" panose="020B0604020202020204" pitchFamily="34" charset="0"/>
         <a:buChar char="•"/>
-        <a:defRPr kern="1200" sz="1500">
+        <a:defRPr sz="1200" kern="1200">
           <a:solidFill>
             <a:schemeClr val="tx1"/>
           </a:solidFill>
@@ -3388,13 +3597,19 @@
           <a:cs typeface="+mn-cs"/>
         </a:defRPr>
       </a:lvl7pPr>
-      <a:lvl8pPr algn="l" defTabSz="342900" eaLnBrk="1" hangingPunct="1" indent="-342900" latinLnBrk="0" marL="2743200" rtl="0">
+      <a:lvl8pPr marL="1243013" indent="-171450" algn="l" defTabSz="685800" rtl="0" eaLnBrk="1" latinLnBrk="0" hangingPunct="1">
+        <a:lnSpc>
+          <a:spcPct val="100000"/>
+        </a:lnSpc>
         <a:spcBef>
-          <a:spcPct val="20000"/>
+          <a:spcPts val="750"/>
         </a:spcBef>
-        <a:buFont typeface="Arial"/>
+        <a:buClr>
+          <a:schemeClr val="accent2"/>
+        </a:buClr>
+        <a:buFont typeface="Arial" panose="020B0604020202020204" pitchFamily="34" charset="0"/>
         <a:buChar char="•"/>
-        <a:defRPr kern="1200" sz="1500">
+        <a:defRPr sz="1200" kern="1200" baseline="0">
           <a:solidFill>
             <a:schemeClr val="tx1"/>
           </a:solidFill>
@@ -3403,13 +3618,19 @@
           <a:cs typeface="+mn-cs"/>
         </a:defRPr>
       </a:lvl8pPr>
-      <a:lvl9pPr algn="l" defTabSz="342900" eaLnBrk="1" hangingPunct="1" indent="-342900" latinLnBrk="0" marL="3086100" rtl="0">
+      <a:lvl9pPr marL="1412081" indent="-171450" algn="l" defTabSz="685800" rtl="0" eaLnBrk="1" latinLnBrk="0" hangingPunct="1">
+        <a:lnSpc>
+          <a:spcPct val="100000"/>
+        </a:lnSpc>
         <a:spcBef>
-          <a:spcPct val="20000"/>
+          <a:spcPts val="750"/>
         </a:spcBef>
-        <a:buFont typeface="Arial"/>
+        <a:buClr>
+          <a:schemeClr val="accent2"/>
+        </a:buClr>
+        <a:buFont typeface="Arial" panose="020B0604020202020204" pitchFamily="34" charset="0"/>
         <a:buChar char="•"/>
-        <a:defRPr kern="1200" sz="1500">
+        <a:defRPr sz="1200" kern="1200" baseline="0">
           <a:solidFill>
             <a:schemeClr val="tx1"/>
           </a:solidFill>
@@ -3423,8 +3644,8 @@
       <a:defPPr>
         <a:defRPr lang="en-US"/>
       </a:defPPr>
-      <a:lvl1pPr algn="l" defTabSz="342900" eaLnBrk="1" hangingPunct="1" latinLnBrk="0" marL="0" rtl="0">
-        <a:defRPr kern="1200" sz="1350">
+      <a:lvl1pPr marL="0" algn="l" defTabSz="685800" rtl="0" eaLnBrk="1" latinLnBrk="0" hangingPunct="1">
+        <a:defRPr sz="1350" kern="1200">
           <a:solidFill>
             <a:schemeClr val="tx1"/>
           </a:solidFill>
@@ -3433,8 +3654,8 @@
           <a:cs typeface="+mn-cs"/>
         </a:defRPr>
       </a:lvl1pPr>
-      <a:lvl2pPr algn="l" defTabSz="342900" eaLnBrk="1" hangingPunct="1" latinLnBrk="0" marL="342900" rtl="0">
-        <a:defRPr kern="1200" sz="1350">
+      <a:lvl2pPr marL="342900" algn="l" defTabSz="685800" rtl="0" eaLnBrk="1" latinLnBrk="0" hangingPunct="1">
+        <a:defRPr sz="1350" kern="1200">
           <a:solidFill>
             <a:schemeClr val="tx1"/>
           </a:solidFill>
@@ -3443,8 +3664,8 @@
           <a:cs typeface="+mn-cs"/>
         </a:defRPr>
       </a:lvl2pPr>
-      <a:lvl3pPr algn="l" defTabSz="342900" eaLnBrk="1" hangingPunct="1" latinLnBrk="0" marL="685800" rtl="0">
-        <a:defRPr kern="1200" sz="1350">
+      <a:lvl3pPr marL="685800" algn="l" defTabSz="685800" rtl="0" eaLnBrk="1" latinLnBrk="0" hangingPunct="1">
+        <a:defRPr sz="1350" kern="1200">
           <a:solidFill>
             <a:schemeClr val="tx1"/>
           </a:solidFill>
@@ -3453,8 +3674,8 @@
           <a:cs typeface="+mn-cs"/>
         </a:defRPr>
       </a:lvl3pPr>
-      <a:lvl4pPr algn="l" defTabSz="342900" eaLnBrk="1" hangingPunct="1" latinLnBrk="0" marL="1028700" rtl="0">
-        <a:defRPr kern="1200" sz="1350">
+      <a:lvl4pPr marL="1028700" algn="l" defTabSz="685800" rtl="0" eaLnBrk="1" latinLnBrk="0" hangingPunct="1">
+        <a:defRPr sz="1350" kern="1200">
           <a:solidFill>
             <a:schemeClr val="tx1"/>
           </a:solidFill>
@@ -3463,8 +3684,8 @@
           <a:cs typeface="+mn-cs"/>
         </a:defRPr>
       </a:lvl4pPr>
-      <a:lvl5pPr algn="l" defTabSz="342900" eaLnBrk="1" hangingPunct="1" latinLnBrk="0" marL="1371600" rtl="0">
-        <a:defRPr kern="1200" sz="1350">
+      <a:lvl5pPr marL="1371600" algn="l" defTabSz="685800" rtl="0" eaLnBrk="1" latinLnBrk="0" hangingPunct="1">
+        <a:defRPr sz="1350" kern="1200">
           <a:solidFill>
             <a:schemeClr val="tx1"/>
           </a:solidFill>
@@ -3473,8 +3694,8 @@
           <a:cs typeface="+mn-cs"/>
         </a:defRPr>
       </a:lvl5pPr>
-      <a:lvl6pPr algn="l" defTabSz="342900" eaLnBrk="1" hangingPunct="1" latinLnBrk="0" marL="1714500" rtl="0">
-        <a:defRPr kern="1200" sz="1350">
+      <a:lvl6pPr marL="1714500" algn="l" defTabSz="685800" rtl="0" eaLnBrk="1" latinLnBrk="0" hangingPunct="1">
+        <a:defRPr sz="1350" kern="1200">
           <a:solidFill>
             <a:schemeClr val="tx1"/>
           </a:solidFill>
@@ -3483,8 +3704,8 @@
           <a:cs typeface="+mn-cs"/>
         </a:defRPr>
       </a:lvl6pPr>
-      <a:lvl7pPr algn="l" defTabSz="342900" eaLnBrk="1" hangingPunct="1" latinLnBrk="0" marL="2057400" rtl="0">
-        <a:defRPr kern="1200" sz="1350">
+      <a:lvl7pPr marL="2057400" algn="l" defTabSz="685800" rtl="0" eaLnBrk="1" latinLnBrk="0" hangingPunct="1">
+        <a:defRPr sz="1350" kern="1200">
           <a:solidFill>
             <a:schemeClr val="tx1"/>
           </a:solidFill>
@@ -3493,8 +3714,8 @@
           <a:cs typeface="+mn-cs"/>
         </a:defRPr>
       </a:lvl7pPr>
-      <a:lvl8pPr algn="l" defTabSz="342900" eaLnBrk="1" hangingPunct="1" latinLnBrk="0" marL="2400300" rtl="0">
-        <a:defRPr kern="1200" sz="1350">
+      <a:lvl8pPr marL="2400300" algn="l" defTabSz="685800" rtl="0" eaLnBrk="1" latinLnBrk="0" hangingPunct="1">
+        <a:defRPr sz="1350" kern="1200">
           <a:solidFill>
             <a:schemeClr val="tx1"/>
           </a:solidFill>
@@ -3503,8 +3724,8 @@
           <a:cs typeface="+mn-cs"/>
         </a:defRPr>
       </a:lvl8pPr>
-      <a:lvl9pPr algn="l" defTabSz="342900" eaLnBrk="1" hangingPunct="1" latinLnBrk="0" marL="2743200" rtl="0">
-        <a:defRPr kern="1200" sz="1350">
+      <a:lvl9pPr marL="2743200" algn="l" defTabSz="685800" rtl="0" eaLnBrk="1" latinLnBrk="0" hangingPunct="1">
+        <a:defRPr sz="1350" kern="1200">
           <a:solidFill>
             <a:schemeClr val="tx1"/>
           </a:solidFill>
@@ -3545,21 +3766,15 @@
             <p:ph type="ctrTitle"/>
           </p:nvPr>
         </p:nvSpPr>
-        <p:spPr>
-          <a:xfrm>
-            <a:off x="685800" y="1597819"/>
-            <a:ext cx="7772400" cy="1102519"/>
-          </a:xfrm>
-        </p:spPr>
+        <p:spPr/>
         <p:txBody>
           <a:bodyPr/>
           <a:lstStyle/>
           <a:p>
-            <a:pPr lvl="0" indent="0" marL="0">
+            <a:pPr marL="0" lvl="0" indent="0">
               <a:buNone/>
             </a:pPr>
             <a:r>
-              <a:rPr/>
               <a:t>Quarto</a:t>
             </a:r>
           </a:p>
@@ -3572,30 +3787,23 @@
             <a:spLocks noGrp="1"/>
           </p:cNvSpPr>
           <p:nvPr>
-            <p:ph idx="1" type="subTitle"/>
-          </p:nvPr>
-        </p:nvSpPr>
-        <p:spPr>
-          <a:xfrm>
-            <a:off x="1371600" y="2914650"/>
-            <a:ext cx="6400800" cy="1314450"/>
-          </a:xfrm>
-        </p:spPr>
+            <p:ph type="subTitle" idx="1"/>
+          </p:nvPr>
+        </p:nvSpPr>
+        <p:spPr/>
         <p:txBody>
           <a:bodyPr/>
           <a:lstStyle/>
           <a:p>
-            <a:pPr lvl="0" indent="0" marL="0">
+            <a:pPr marL="0" lvl="0" indent="0">
               <a:buNone/>
             </a:pPr>
             <a:r>
-              <a:rPr/>
               <a:t>Presentation formats</a:t>
             </a:r>
             <a:br/>
             <a:br/>
             <a:r>
-              <a:rPr/>
               <a:t>Wojciech Hardy</a:t>
             </a:r>
           </a:p>
@@ -3608,7 +3816,7 @@
             <a:spLocks noGrp="1"/>
           </p:cNvSpPr>
           <p:nvPr>
-            <p:ph idx="10" sz="half" type="dt"/>
+            <p:ph type="dt" sz="half" idx="10"/>
           </p:nvPr>
         </p:nvSpPr>
         <p:spPr/>
@@ -3616,11 +3824,10 @@
           <a:bodyPr/>
           <a:lstStyle/>
           <a:p>
-            <a:pPr lvl="0" indent="0" marL="0">
+            <a:pPr marL="0" lvl="0" indent="0">
               <a:buNone/>
             </a:pPr>
             <a:r>
-              <a:rPr/>
               <a:t>4/27/23</a:t>
             </a:r>
           </a:p>
@@ -3628,6 +3835,9 @@
       </p:sp>
     </p:spTree>
   </p:cSld>
+  <p:clrMapOvr>
+    <a:masterClrMapping/>
+  </p:clrMapOvr>
 </p:sld>
 </file>
 
@@ -3658,21 +3868,15 @@
             <p:ph type="title"/>
           </p:nvPr>
         </p:nvSpPr>
-        <p:spPr>
-          <a:xfrm>
-            <a:off x="722313" y="3305176"/>
-            <a:ext cx="7772400" cy="1021556"/>
-          </a:xfrm>
-        </p:spPr>
+        <p:spPr/>
         <p:txBody>
           <a:bodyPr/>
           <a:lstStyle/>
           <a:p>
-            <a:pPr lvl="0" indent="0" marL="0">
+            <a:pPr marL="0" lvl="0" indent="0">
               <a:buNone/>
             </a:pPr>
             <a:r>
-              <a:rPr/>
               <a:t>Other popular formats</a:t>
             </a:r>
           </a:p>
@@ -3680,6 +3884,9 @@
       </p:sp>
     </p:spTree>
   </p:cSld>
+  <p:clrMapOvr>
+    <a:masterClrMapping/>
+  </p:clrMapOvr>
 </p:sld>
 </file>
 
@@ -3715,11 +3922,10 @@
           <a:bodyPr/>
           <a:lstStyle/>
           <a:p>
-            <a:pPr lvl="0" indent="0" marL="0">
+            <a:pPr marL="0" lvl="0" indent="0">
               <a:buNone/>
             </a:pPr>
             <a:r>
-              <a:rPr/>
               <a:t>Slidy</a:t>
             </a:r>
           </a:p>
@@ -3737,10 +3943,12 @@
         </p:nvSpPr>
         <p:spPr/>
         <p:txBody>
-          <a:bodyPr/>
-          <a:lstStyle/>
-          <a:p>
-            <a:pPr lvl="0" indent="0" marL="0">
+          <a:bodyPr>
+            <a:normAutofit fontScale="70000" lnSpcReduction="20000"/>
+          </a:bodyPr>
+          <a:lstStyle/>
+          <a:p>
+            <a:pPr marL="0" lvl="0" indent="0">
               <a:buNone/>
             </a:pPr>
             <a:r>
@@ -3751,45 +3959,40 @@
             </a:r>
             <a:r>
               <a:rPr>
-                <a:hlinkClick r:id="rId3"/>
-                <a:latin typeface="Courier"/>
+                <a:hlinkClick r:id="rId2"/>
               </a:rPr>
               <a:t>Slidy</a:t>
             </a:r>
             <a:r>
               <a:rPr>
-                <a:hlinkClick r:id="rId4"/>
+                <a:hlinkClick r:id="rId2"/>
               </a:rPr>
               <a:t> presentation</a:t>
             </a:r>
           </a:p>
           <a:p>
-            <a:pPr lvl="0" indent="0" marL="0">
+            <a:pPr marL="0" lvl="0" indent="0">
               <a:buNone/>
             </a:pPr>
             <a:r>
-              <a:rPr/>
               <a:t>Let’s modify the output to slidy and see what happens.</a:t>
             </a:r>
           </a:p>
           <a:p>
             <a:pPr lvl="0"/>
             <a:r>
-              <a:rPr/>
               <a:t>Lots of stuff stopped working.</a:t>
             </a:r>
           </a:p>
           <a:p>
             <a:pPr lvl="0"/>
             <a:r>
-              <a:rPr/>
               <a:t>But of course we have new options as well.</a:t>
             </a:r>
           </a:p>
           <a:p>
             <a:pPr lvl="0"/>
             <a:r>
-              <a:rPr/>
               <a:t>Press </a:t>
             </a:r>
             <a:r>
@@ -3799,14 +4002,12 @@
               <a:t>c</a:t>
             </a:r>
             <a:r>
-              <a:rPr/>
               <a:t> for a table of contents</a:t>
             </a:r>
           </a:p>
           <a:p>
             <a:pPr lvl="0"/>
             <a:r>
-              <a:rPr/>
               <a:t>Press </a:t>
             </a:r>
             <a:r>
@@ -3816,14 +4017,12 @@
               <a:t>f</a:t>
             </a:r>
             <a:r>
-              <a:rPr/>
               <a:t> to toggle the footer</a:t>
             </a:r>
           </a:p>
           <a:p>
             <a:pPr lvl="0"/>
             <a:r>
-              <a:rPr/>
               <a:t>Press </a:t>
             </a:r>
             <a:r>
@@ -3833,14 +4032,12 @@
               <a:t>a</a:t>
             </a:r>
             <a:r>
-              <a:rPr/>
               <a:t> to display all slides one after another</a:t>
             </a:r>
           </a:p>
           <a:p>
             <a:pPr lvl="0"/>
             <a:r>
-              <a:rPr/>
               <a:t>Press </a:t>
             </a:r>
             <a:r>
@@ -3850,7 +4047,6 @@
               <a:t>s</a:t>
             </a:r>
             <a:r>
-              <a:rPr/>
               <a:t> (</a:t>
             </a:r>
             <a:r>
@@ -3858,7 +4054,6 @@
               <a:t>s</a:t>
             </a:r>
             <a:r>
-              <a:rPr/>
               <a:t>maller) or </a:t>
             </a:r>
             <a:r>
@@ -3868,7 +4063,6 @@
               <a:t>b</a:t>
             </a:r>
             <a:r>
-              <a:rPr/>
               <a:t> (</a:t>
             </a:r>
             <a:r>
@@ -3876,21 +4070,18 @@
               <a:t>b</a:t>
             </a:r>
             <a:r>
-              <a:rPr/>
               <a:t>igger) to change font size</a:t>
             </a:r>
           </a:p>
           <a:p>
             <a:pPr lvl="0"/>
             <a:r>
-              <a:rPr/>
               <a:t>We can also add stuff to the footer like the countdown clock, or info:</a:t>
             </a:r>
           </a:p>
           <a:p>
             <a:pPr lvl="0"/>
             <a:r>
-              <a:rPr/>
               <a:t>“</a:t>
             </a:r>
             <a:r>
@@ -3900,14 +4091,12 @@
               <a:t>duration: 15</a:t>
             </a:r>
             <a:r>
-              <a:rPr/>
               <a:t>”</a:t>
             </a:r>
           </a:p>
           <a:p>
             <a:pPr lvl="0"/>
             <a:r>
-              <a:rPr/>
               <a:t>“</a:t>
             </a:r>
             <a:r>
@@ -3917,7 +4106,6 @@
               <a:t>footer: "Presentation for the RR course."</a:t>
             </a:r>
             <a:r>
-              <a:rPr/>
               <a:t>”</a:t>
             </a:r>
           </a:p>
@@ -3925,6 +4113,9 @@
       </p:sp>
     </p:spTree>
   </p:cSld>
+  <p:clrMapOvr>
+    <a:masterClrMapping/>
+  </p:clrMapOvr>
   <p:timing>
     <p:tnLst>
       <p:par>
@@ -4434,11 +4625,10 @@
           <a:bodyPr/>
           <a:lstStyle/>
           <a:p>
-            <a:pPr lvl="0" indent="0" marL="0">
+            <a:pPr marL="0" lvl="0" indent="0">
               <a:buNone/>
             </a:pPr>
             <a:r>
-              <a:rPr/>
               <a:t>Beamer and Powerpoint</a:t>
             </a:r>
           </a:p>
@@ -4456,10 +4646,12 @@
         </p:nvSpPr>
         <p:spPr/>
         <p:txBody>
-          <a:bodyPr/>
-          <a:lstStyle/>
-          <a:p>
-            <a:pPr lvl="0" indent="0" marL="0">
+          <a:bodyPr>
+            <a:normAutofit lnSpcReduction="10000"/>
+          </a:bodyPr>
+          <a:lstStyle/>
+          <a:p>
+            <a:pPr marL="0" lvl="0" indent="0">
               <a:buNone/>
             </a:pPr>
             <a:r>
@@ -4470,36 +4662,33 @@
             </a:r>
             <a:r>
               <a:rPr>
-                <a:hlinkClick r:id="rId3"/>
-                <a:latin typeface="Courier"/>
+                <a:hlinkClick r:id="rId2"/>
               </a:rPr>
               <a:t>Beamer</a:t>
             </a:r>
             <a:r>
               <a:rPr>
-                <a:hlinkClick r:id="rId4"/>
+                <a:hlinkClick r:id="rId2"/>
               </a:rPr>
               <a:t> presentation</a:t>
             </a:r>
           </a:p>
           <a:p>
-            <a:pPr lvl="0" indent="0" marL="0">
+            <a:pPr marL="0" lvl="0" indent="0">
               <a:buNone/>
             </a:pPr>
             <a:r>
-              <a:rPr/>
               <a:t>Beamer uses LaTeX, so again you can use LaTeX syntax here.</a:t>
             </a:r>
           </a:p>
           <a:p>
             <a:pPr lvl="0"/>
             <a:r>
-              <a:rPr/>
               <a:t>Some nice themes here, try:</a:t>
             </a:r>
           </a:p>
           <a:p>
-            <a:pPr lvl="0" indent="0" marL="0">
+            <a:pPr marL="0" lvl="0" indent="0">
               <a:buNone/>
             </a:pPr>
             <a:r>
@@ -4538,11 +4727,10 @@
             </a:r>
           </a:p>
           <a:p>
-            <a:pPr lvl="0" indent="0" marL="0">
+            <a:pPr marL="0" lvl="0" indent="0">
               <a:buNone/>
             </a:pPr>
             <a:r>
-              <a:rPr/>
               <a:t>You can also check </a:t>
             </a:r>
             <a:r>
@@ -4556,6 +4744,9 @@
       </p:sp>
     </p:spTree>
   </p:cSld>
+  <p:clrMapOvr>
+    <a:masterClrMapping/>
+  </p:clrMapOvr>
 </p:sld>
 </file>
 
@@ -4586,21 +4777,15 @@
             <p:ph type="title"/>
           </p:nvPr>
         </p:nvSpPr>
-        <p:spPr>
-          <a:xfrm>
-            <a:off x="722313" y="3305176"/>
-            <a:ext cx="7772400" cy="1021556"/>
-          </a:xfrm>
-        </p:spPr>
+        <p:spPr/>
         <p:txBody>
           <a:bodyPr/>
           <a:lstStyle/>
           <a:p>
-            <a:pPr lvl="0" indent="0" marL="0">
+            <a:pPr marL="0" lvl="0" indent="0">
               <a:buNone/>
             </a:pPr>
             <a:r>
-              <a:rPr/>
               <a:t>We start with </a:t>
             </a:r>
             <a:r>
@@ -4612,6 +4797,9 @@
       </p:sp>
     </p:spTree>
   </p:cSld>
+  <p:clrMapOvr>
+    <a:masterClrMapping/>
+  </p:clrMapOvr>
 </p:sld>
 </file>
 
@@ -4644,14 +4832,15 @@
         </p:nvSpPr>
         <p:spPr/>
         <p:txBody>
-          <a:bodyPr/>
-          <a:lstStyle/>
-          <a:p>
-            <a:pPr lvl="0" indent="0" marL="0">
+          <a:bodyPr>
+            <a:normAutofit fontScale="90000"/>
+          </a:bodyPr>
+          <a:lstStyle/>
+          <a:p>
+            <a:pPr marL="0" lvl="0" indent="0">
               <a:buNone/>
             </a:pPr>
             <a:r>
-              <a:rPr/>
               <a:t>The basics | </a:t>
             </a:r>
             <a:r>
@@ -4680,7 +4869,6 @@
           <a:p>
             <a:pPr lvl="0"/>
             <a:r>
-              <a:rPr/>
               <a:t>For details and more options see </a:t>
             </a:r>
             <a:r>
@@ -4693,21 +4881,18 @@
           <a:p>
             <a:pPr lvl="0"/>
             <a:r>
-              <a:rPr/>
               <a:t>Remember that you can insert code chunks in all formats.</a:t>
             </a:r>
           </a:p>
           <a:p>
             <a:pPr lvl="0"/>
             <a:r>
-              <a:rPr/>
               <a:t>YAML info constitutes the first main slide.</a:t>
             </a:r>
           </a:p>
           <a:p>
             <a:pPr lvl="0"/>
             <a:r>
-              <a:rPr/>
               <a:t>Two hashes and a title (</a:t>
             </a:r>
             <a:r>
@@ -4717,14 +4902,12 @@
               <a:t>## The basics of slides</a:t>
             </a:r>
             <a:r>
-              <a:rPr/>
               <a:t>) create a new slide (like the one you’re reading now)</a:t>
             </a:r>
           </a:p>
           <a:p>
             <a:pPr lvl="0"/>
             <a:r>
-              <a:rPr/>
               <a:t>Single hash creates a section slide (</a:t>
             </a:r>
             <a:r>
@@ -4734,7 +4917,6 @@
               <a:t># Section 1</a:t>
             </a:r>
             <a:r>
-              <a:rPr/>
               <a:t>)</a:t>
             </a:r>
           </a:p>
@@ -4742,6 +4924,9 @@
       </p:sp>
     </p:spTree>
   </p:cSld>
+  <p:clrMapOvr>
+    <a:masterClrMapping/>
+  </p:clrMapOvr>
 </p:sld>
 </file>
 
@@ -4772,21 +4957,15 @@
             <p:ph type="title"/>
           </p:nvPr>
         </p:nvSpPr>
-        <p:spPr>
-          <a:xfrm>
-            <a:off x="722313" y="3305176"/>
-            <a:ext cx="7772400" cy="1021556"/>
-          </a:xfrm>
-        </p:spPr>
+        <p:spPr/>
         <p:txBody>
           <a:bodyPr/>
           <a:lstStyle/>
           <a:p>
-            <a:pPr lvl="0" indent="0" marL="0">
+            <a:pPr marL="0" lvl="0" indent="0">
               <a:buNone/>
             </a:pPr>
             <a:r>
-              <a:rPr/>
               <a:t>Section 1</a:t>
             </a:r>
           </a:p>
@@ -4794,6 +4973,9 @@
       </p:sp>
     </p:spTree>
   </p:cSld>
+  <p:clrMapOvr>
+    <a:masterClrMapping/>
+  </p:clrMapOvr>
 </p:sld>
 </file>
 
@@ -4826,39 +5008,39 @@
         </p:nvSpPr>
         <p:spPr/>
         <p:txBody>
+          <a:bodyPr>
+            <a:normAutofit fontScale="90000"/>
+          </a:bodyPr>
+          <a:lstStyle/>
+          <a:p>
+            <a:pPr marL="0" lvl="0" indent="0">
+              <a:buNone/>
+            </a:pPr>
+            <a:r>
+              <a:t>Sections… | they have subtitles sometimes</a:t>
+            </a:r>
+          </a:p>
+        </p:txBody>
+      </p:sp>
+      <p:sp>
+        <p:nvSpPr>
+          <p:cNvPr id="3" name="Content Placeholder 2"/>
+          <p:cNvSpPr>
+            <a:spLocks noGrp="1"/>
+          </p:cNvSpPr>
+          <p:nvPr>
+            <p:ph idx="1"/>
+          </p:nvPr>
+        </p:nvSpPr>
+        <p:spPr/>
+        <p:txBody>
           <a:bodyPr/>
           <a:lstStyle/>
           <a:p>
-            <a:pPr lvl="0" indent="0" marL="0">
+            <a:pPr marL="0" lvl="0" indent="0">
               <a:buNone/>
             </a:pPr>
             <a:r>
-              <a:rPr/>
-              <a:t>Sections… | they have subtitles sometimes</a:t>
-            </a:r>
-          </a:p>
-        </p:txBody>
-      </p:sp>
-      <p:sp>
-        <p:nvSpPr>
-          <p:cNvPr id="3" name="Content Placeholder 2"/>
-          <p:cNvSpPr>
-            <a:spLocks noGrp="1"/>
-          </p:cNvSpPr>
-          <p:nvPr>
-            <p:ph idx="1"/>
-          </p:nvPr>
-        </p:nvSpPr>
-        <p:spPr/>
-        <p:txBody>
-          <a:bodyPr/>
-          <a:lstStyle/>
-          <a:p>
-            <a:pPr lvl="0" indent="0" marL="0">
-              <a:buNone/>
-            </a:pPr>
-            <a:r>
-              <a:rPr/>
               <a:t>Adding a pipe </a:t>
             </a:r>
             <a:r>
@@ -4868,16 +5050,14 @@
               <a:t>|</a:t>
             </a:r>
             <a:r>
-              <a:rPr/>
               <a:t> symbol in the slide title allows you to create subtitles.</a:t>
             </a:r>
           </a:p>
           <a:p>
-            <a:pPr lvl="0" indent="0" marL="0">
+            <a:pPr marL="0" lvl="0" indent="0">
               <a:buNone/>
             </a:pPr>
             <a:r>
-              <a:rPr/>
               <a:t>e.g. </a:t>
             </a:r>
             <a:r>
@@ -4891,6 +5071,9 @@
       </p:sp>
     </p:spTree>
   </p:cSld>
+  <p:clrMapOvr>
+    <a:masterClrMapping/>
+  </p:clrMapOvr>
 </p:sld>
 </file>
 
@@ -4926,11 +5109,10 @@
           <a:bodyPr/>
           <a:lstStyle/>
           <a:p>
-            <a:pPr lvl="0" indent="0" marL="0">
+            <a:pPr marL="0" lvl="0" indent="0">
               <a:buNone/>
             </a:pPr>
             <a:r>
-              <a:rPr/>
               <a:t>Display modes</a:t>
             </a:r>
           </a:p>
@@ -4951,11 +5133,10 @@
           <a:bodyPr/>
           <a:lstStyle/>
           <a:p>
-            <a:pPr lvl="0" indent="0" marL="0">
+            <a:pPr marL="0" lvl="0" indent="0">
               <a:buNone/>
             </a:pPr>
             <a:r>
-              <a:rPr/>
               <a:t>ioslides provides several shortcuts for handy display modes.</a:t>
             </a:r>
           </a:p>
@@ -4968,7 +5149,6 @@
               <a:t>f</a:t>
             </a:r>
             <a:r>
-              <a:rPr/>
               <a:t> - fullscreen mode</a:t>
             </a:r>
           </a:p>
@@ -4981,7 +5161,6 @@
               <a:t>w</a:t>
             </a:r>
             <a:r>
-              <a:rPr/>
               <a:t> - widescreen mode</a:t>
             </a:r>
           </a:p>
@@ -4994,7 +5173,6 @@
               <a:t>o</a:t>
             </a:r>
             <a:r>
-              <a:rPr/>
               <a:t> - overview mode</a:t>
             </a:r>
           </a:p>
@@ -5007,7 +5185,6 @@
               <a:t>h</a:t>
             </a:r>
             <a:r>
-              <a:rPr/>
               <a:t> - code highlight mode (I’m not sure what that’s supposed to do…)</a:t>
             </a:r>
           </a:p>
@@ -5020,7 +5197,6 @@
               <a:t>p</a:t>
             </a:r>
             <a:r>
-              <a:rPr/>
               <a:t> - show presenter notes</a:t>
             </a:r>
           </a:p>
@@ -5028,6 +5204,9 @@
       </p:sp>
     </p:spTree>
   </p:cSld>
+  <p:clrMapOvr>
+    <a:masterClrMapping/>
+  </p:clrMapOvr>
 </p:sld>
 </file>
 
@@ -5063,11 +5242,10 @@
           <a:bodyPr/>
           <a:lstStyle/>
           <a:p>
-            <a:pPr lvl="0" indent="0" marL="0">
+            <a:pPr marL="0" lvl="0" indent="0">
               <a:buNone/>
             </a:pPr>
             <a:r>
-              <a:rPr/>
               <a:t>Incremental bullets</a:t>
             </a:r>
           </a:p>
@@ -5090,7 +5268,6 @@
           <a:p>
             <a:pPr lvl="0"/>
             <a:r>
-              <a:rPr/>
               <a:t>Use </a:t>
             </a:r>
             <a:r>
@@ -5100,21 +5277,18 @@
               <a:t>incremental: true</a:t>
             </a:r>
             <a:r>
-              <a:rPr/>
               <a:t> option in YAML to have the bullet points appear one by one.</a:t>
             </a:r>
           </a:p>
           <a:p>
             <a:pPr lvl="0"/>
             <a:r>
-              <a:rPr/>
               <a:t>Alternatively, you can do this only for a specific list.</a:t>
             </a:r>
           </a:p>
           <a:p>
             <a:pPr lvl="0"/>
             <a:r>
-              <a:rPr/>
               <a:t>to achieve this, write “</a:t>
             </a:r>
             <a:r>
@@ -5124,7 +5298,6 @@
               <a:t>&gt; -</a:t>
             </a:r>
             <a:r>
-              <a:rPr/>
               <a:t>” instead of just “</a:t>
             </a:r>
             <a:r>
@@ -5134,7 +5307,6 @@
               <a:t>-</a:t>
             </a:r>
             <a:r>
-              <a:rPr/>
               <a:t>”</a:t>
             </a:r>
           </a:p>
@@ -5142,6 +5314,9 @@
       </p:sp>
     </p:spTree>
   </p:cSld>
+  <p:clrMapOvr>
+    <a:masterClrMapping/>
+  </p:clrMapOvr>
   <p:timing>
     <p:tnLst>
       <p:par>
@@ -5354,37 +5529,37 @@
         </p:nvSpPr>
         <p:spPr/>
         <p:txBody>
+          <a:bodyPr>
+            <a:normAutofit fontScale="90000"/>
+          </a:bodyPr>
+          <a:lstStyle/>
+          <a:p>
+            <a:pPr marL="0" lvl="0" indent="0">
+              <a:buNone/>
+            </a:pPr>
+            <a:r>
+              <a:t>Manipulating the presentation size</a:t>
+            </a:r>
+          </a:p>
+        </p:txBody>
+      </p:sp>
+      <p:sp>
+        <p:nvSpPr>
+          <p:cNvPr id="3" name="Content Placeholder 2"/>
+          <p:cNvSpPr>
+            <a:spLocks noGrp="1"/>
+          </p:cNvSpPr>
+          <p:nvPr>
+            <p:ph idx="1"/>
+          </p:nvPr>
+        </p:nvSpPr>
+        <p:spPr/>
+        <p:txBody>
           <a:bodyPr/>
           <a:lstStyle/>
           <a:p>
-            <a:pPr lvl="0" indent="0" marL="0">
-              <a:buNone/>
-            </a:pPr>
-            <a:r>
-              <a:rPr/>
-              <a:t>Manipulating the presentation size</a:t>
-            </a:r>
-          </a:p>
-        </p:txBody>
-      </p:sp>
-      <p:sp>
-        <p:nvSpPr>
-          <p:cNvPr id="3" name="Content Placeholder 2"/>
-          <p:cNvSpPr>
-            <a:spLocks noGrp="1"/>
-          </p:cNvSpPr>
-          <p:nvPr>
-            <p:ph idx="1"/>
-          </p:nvPr>
-        </p:nvSpPr>
-        <p:spPr/>
-        <p:txBody>
-          <a:bodyPr/>
-          <a:lstStyle/>
-          <a:p>
             <a:pPr lvl="0"/>
             <a:r>
-              <a:rPr/>
               <a:t>Use “</a:t>
             </a:r>
             <a:r>
@@ -5394,14 +5569,12 @@
               <a:t>widescreen: true</a:t>
             </a:r>
             <a:r>
-              <a:rPr/>
               <a:t>” to toggle widescreen on by default.</a:t>
             </a:r>
           </a:p>
           <a:p>
             <a:pPr lvl="0"/>
             <a:r>
-              <a:rPr/>
               <a:t>Use “</a:t>
             </a:r>
             <a:r>
@@ -5411,14 +5584,12 @@
               <a:t>smaller: true</a:t>
             </a:r>
             <a:r>
-              <a:rPr/>
               <a:t>” to keep the font size small.</a:t>
             </a:r>
           </a:p>
           <a:p>
             <a:pPr lvl="0"/>
             <a:r>
-              <a:rPr/>
               <a:t>Alternatively, you can put “</a:t>
             </a:r>
             <a:r>
@@ -5428,7 +5599,6 @@
               <a:t>{.smaller}</a:t>
             </a:r>
             <a:r>
-              <a:rPr/>
               <a:t>” right after your slide header to apply this only locally (like in this slide)</a:t>
             </a:r>
           </a:p>
@@ -5436,6 +5606,9 @@
       </p:sp>
     </p:spTree>
   </p:cSld>
+  <p:clrMapOvr>
+    <a:masterClrMapping/>
+  </p:clrMapOvr>
 </p:sld>
 </file>
 
@@ -5468,14 +5641,15 @@
         </p:nvSpPr>
         <p:spPr/>
         <p:txBody>
-          <a:bodyPr/>
-          <a:lstStyle/>
-          <a:p>
-            <a:pPr lvl="0" indent="0" marL="0">
+          <a:bodyPr>
+            <a:normAutofit fontScale="90000"/>
+          </a:bodyPr>
+          <a:lstStyle/>
+          <a:p>
+            <a:pPr marL="0" lvl="0" indent="0">
               <a:buNone/>
             </a:pPr>
             <a:r>
-              <a:rPr/>
               <a:t>Other options worth mentioning:</a:t>
             </a:r>
           </a:p>
@@ -5493,12 +5667,13 @@
         </p:nvSpPr>
         <p:spPr/>
         <p:txBody>
-          <a:bodyPr/>
+          <a:bodyPr>
+            <a:normAutofit fontScale="85000" lnSpcReduction="10000"/>
+          </a:bodyPr>
           <a:lstStyle/>
           <a:p>
             <a:pPr lvl="0"/>
             <a:r>
-              <a:rPr/>
               <a:t>“</a:t>
             </a:r>
             <a:r>
@@ -5508,14 +5683,12 @@
               <a:t>transition: slower/faster/_numeric value_</a:t>
             </a:r>
             <a:r>
-              <a:rPr/>
               <a:t>” to modify slide transitions.</a:t>
             </a:r>
           </a:p>
           <a:p>
             <a:pPr lvl="0"/>
             <a:r>
-              <a:rPr/>
               <a:t>“</a:t>
             </a:r>
             <a:r>
@@ -5525,14 +5698,12 @@
               <a:t>{.build}</a:t>
             </a:r>
             <a:r>
-              <a:rPr/>
               <a:t>” after a slide header, to make the content appear gradually (like here).</a:t>
             </a:r>
           </a:p>
           <a:p>
             <a:pPr lvl="0"/>
             <a:r>
-              <a:rPr/>
               <a:t>“</a:t>
             </a:r>
             <a:r>
@@ -5542,7 +5713,6 @@
               <a:t>data-background:</a:t>
             </a:r>
             <a:r>
-              <a:rPr/>
               <a:t>” attribute to modify the background image (</a:t>
             </a:r>
             <a:r>
@@ -5552,14 +5722,12 @@
               <a:t>photo source</a:t>
             </a:r>
             <a:r>
-              <a:rPr/>
               <a:t>)</a:t>
             </a:r>
           </a:p>
           <a:p>
             <a:pPr lvl="0"/>
             <a:r>
-              <a:rPr/>
               <a:t>CSS styles still work (“</a:t>
             </a:r>
             <a:r>
@@ -5569,14 +5737,12 @@
               <a:t>css: styles.css</a:t>
             </a:r>
             <a:r>
-              <a:rPr/>
               <a:t>”)</a:t>
             </a:r>
           </a:p>
           <a:p>
             <a:pPr lvl="0"/>
             <a:r>
-              <a:rPr/>
               <a:t>“</a:t>
             </a:r>
             <a:r>
@@ -5586,23 +5752,20 @@
               <a:t>logo:</a:t>
             </a:r>
             <a:r>
-              <a:rPr/>
               <a:t> for a logo image”</a:t>
             </a:r>
           </a:p>
           <a:p>
             <a:pPr lvl="0"/>
             <a:r>
-              <a:rPr/>
               <a:t>Use html syntax with specific classes for more options, e.g. to color stuff</a:t>
             </a:r>
           </a:p>
           <a:p>
-            <a:pPr lvl="1" indent="0" marL="342900">
+            <a:pPr marL="342900" lvl="1" indent="0">
               <a:buNone/>
             </a:pPr>
             <a:r>
-              <a:rPr/>
               <a:t>(“</a:t>
             </a:r>
             <a:r>
@@ -5612,14 +5775,12 @@
               <a:t>&lt;div class="red2"&gt; text &lt;/div&gt;</a:t>
             </a:r>
             <a:r>
-              <a:rPr/>
               <a:t>”)</a:t>
             </a:r>
           </a:p>
           <a:p>
             <a:pPr lvl="0"/>
             <a:r>
-              <a:rPr/>
               <a:t>You can add notes using “</a:t>
             </a:r>
             <a:r>
@@ -5629,7 +5790,6 @@
               <a:t>&lt;div class="notes"&gt;These are some hidden notes for the presenter (they can include MD as well)&lt;/div&gt;</a:t>
             </a:r>
             <a:r>
-              <a:rPr/>
               <a:t>” and then view them using </a:t>
             </a:r>
             <a:r>
@@ -5639,7 +5799,6 @@
               <a:t>p</a:t>
             </a:r>
             <a:r>
-              <a:rPr/>
               <a:t> or adding “</a:t>
             </a:r>
             <a:r>
@@ -5649,7 +5808,6 @@
               <a:t>?presentme=true</a:t>
             </a:r>
             <a:r>
-              <a:rPr/>
               <a:t>” to the URL (try both to see the outcomes).</a:t>
             </a:r>
           </a:p>
@@ -5657,95 +5815,65 @@
       </p:sp>
     </p:spTree>
   </p:cSld>
+  <p:clrMapOvr>
+    <a:masterClrMapping/>
+  </p:clrMapOvr>
 </p:sld>
 </file>
 
 <file path=ppt/theme/theme1.xml><?xml version="1.0" encoding="utf-8"?>
-<a:theme xmlns:a="http://schemas.openxmlformats.org/drawingml/2006/main" name="Office Theme">
+<a:theme xmlns:a="http://schemas.openxmlformats.org/drawingml/2006/main" name="Parcel">
   <a:themeElements>
-    <a:clrScheme name="Office">
+    <a:clrScheme name="Parcel">
       <a:dk1>
-        <a:sysClr val="windowText" lastClr="000000"/>
+        <a:srgbClr val="000000"/>
       </a:dk1>
       <a:lt1>
-        <a:sysClr val="window" lastClr="FFFFFF"/>
+        <a:srgbClr val="FFFFFF"/>
       </a:lt1>
       <a:dk2>
-        <a:srgbClr val="1F497D"/>
+        <a:srgbClr val="4A5356"/>
       </a:dk2>
       <a:lt2>
-        <a:srgbClr val="EEECE1"/>
+        <a:srgbClr val="E8E3CE"/>
       </a:lt2>
       <a:accent1>
-        <a:srgbClr val="4F81BD"/>
+        <a:srgbClr val="F6A21D"/>
       </a:accent1>
       <a:accent2>
-        <a:srgbClr val="C0504D"/>
+        <a:srgbClr val="9BAFB5"/>
       </a:accent2>
       <a:accent3>
-        <a:srgbClr val="9BBB59"/>
+        <a:srgbClr val="C96731"/>
       </a:accent3>
       <a:accent4>
-        <a:srgbClr val="8064A2"/>
+        <a:srgbClr val="9CA383"/>
       </a:accent4>
       <a:accent5>
-        <a:srgbClr val="4BACC6"/>
+        <a:srgbClr val="87795D"/>
       </a:accent5>
       <a:accent6>
-        <a:srgbClr val="F79646"/>
+        <a:srgbClr val="A0988C"/>
       </a:accent6>
       <a:hlink>
-        <a:srgbClr val="0000FF"/>
+        <a:srgbClr val="00B0F0"/>
       </a:hlink>
       <a:folHlink>
-        <a:srgbClr val="800080"/>
+        <a:srgbClr val="738F97"/>
       </a:folHlink>
     </a:clrScheme>
-    <a:fontScheme name="Office">
+    <a:fontScheme name="Parcel">
       <a:majorFont>
-        <a:latin typeface="Calibri"/>
+        <a:latin typeface="Gill Sans MT" panose="020B0502020104020203"/>
         <a:ea typeface=""/>
         <a:cs typeface=""/>
-        <a:font script="Jpan" typeface="ＭＳ Ｐゴシック"/>
-        <a:font script="Hang" typeface="맑은 고딕"/>
-        <a:font script="Hans" typeface="宋体"/>
-        <a:font script="Hant" typeface="新細明體"/>
-        <a:font script="Arab" typeface="Times New Roman"/>
-        <a:font script="Hebr" typeface="Times New Roman"/>
-        <a:font script="Thai" typeface="Angsana New"/>
-        <a:font script="Ethi" typeface="Nyala"/>
-        <a:font script="Beng" typeface="Vrinda"/>
-        <a:font script="Gujr" typeface="Shruti"/>
-        <a:font script="Khmr" typeface="MoolBoran"/>
-        <a:font script="Knda" typeface="Tunga"/>
-        <a:font script="Guru" typeface="Raavi"/>
-        <a:font script="Cans" typeface="Euphemia"/>
-        <a:font script="Cher" typeface="Plantagenet Cherokee"/>
-        <a:font script="Yiii" typeface="Microsoft Yi Baiti"/>
-        <a:font script="Tibt" typeface="Microsoft Himalaya"/>
-        <a:font script="Thaa" typeface="MV Boli"/>
-        <a:font script="Deva" typeface="Mangal"/>
-        <a:font script="Telu" typeface="Gautami"/>
-        <a:font script="Taml" typeface="Latha"/>
-        <a:font script="Syrc" typeface="Estrangelo Edessa"/>
-        <a:font script="Orya" typeface="Kalinga"/>
-        <a:font script="Mlym" typeface="Kartika"/>
-        <a:font script="Laoo" typeface="DokChampa"/>
-        <a:font script="Sinh" typeface="Iskoola Pota"/>
-        <a:font script="Mong" typeface="Mongolian Baiti"/>
-        <a:font script="Viet" typeface="Times New Roman"/>
-        <a:font script="Uigh" typeface="Microsoft Uighur"/>
-        <a:font script="Geor" typeface="Sylfaen"/>
-      </a:majorFont>
-      <a:minorFont>
-        <a:latin typeface="Calibri"/>
-        <a:ea typeface=""/>
-        <a:cs typeface=""/>
-        <a:font script="Jpan" typeface="ＭＳ Ｐゴシック"/>
-        <a:font script="Hang" typeface="맑은 고딕"/>
-        <a:font script="Hans" typeface="宋体"/>
-        <a:font script="Hant" typeface="新細明體"/>
-        <a:font script="Arab" typeface="Arial"/>
+        <a:font script="Grek" typeface="Corbel"/>
+        <a:font script="Cyrl" typeface="Corbel"/>
+        <a:font script="Jpan" typeface="HGｺﾞｼｯｸE"/>
+        <a:font script="Hang" typeface="휴먼매직체"/>
+        <a:font script="Hans" typeface="华文中宋"/>
+        <a:font script="Hant" typeface="微軟正黑體"/>
+        <a:font script="Arab" typeface="Majalla UI"/>
         <a:font script="Hebr" typeface="Arial"/>
         <a:font script="Thai" typeface="Cordia New"/>
         <a:font script="Ethi" typeface="Nyala"/>
@@ -5768,12 +5896,49 @@
         <a:font script="Laoo" typeface="DokChampa"/>
         <a:font script="Sinh" typeface="Iskoola Pota"/>
         <a:font script="Mong" typeface="Mongolian Baiti"/>
-        <a:font script="Viet" typeface="Arial"/>
+        <a:font script="Viet" typeface="Tahoma"/>
+        <a:font script="Uigh" typeface="Microsoft Uighur"/>
+        <a:font script="Geor" typeface="Sylfaen"/>
+      </a:majorFont>
+      <a:minorFont>
+        <a:latin typeface="Gill Sans MT" panose="020B0502020104020203"/>
+        <a:ea typeface=""/>
+        <a:cs typeface=""/>
+        <a:font script="Grek" typeface="Corbel"/>
+        <a:font script="Cyrl" typeface="Corbel"/>
+        <a:font script="Jpan" typeface="HGｺﾞｼｯｸE"/>
+        <a:font script="Hang" typeface="휴먼매직체"/>
+        <a:font script="Hans" typeface="华文中宋"/>
+        <a:font script="Hant" typeface="微軟正黑體"/>
+        <a:font script="Arab" typeface="Majalla UI"/>
+        <a:font script="Hebr" typeface="Arial"/>
+        <a:font script="Thai" typeface="Cordia New"/>
+        <a:font script="Ethi" typeface="Nyala"/>
+        <a:font script="Beng" typeface="Vrinda"/>
+        <a:font script="Gujr" typeface="Shruti"/>
+        <a:font script="Khmr" typeface="DaunPenh"/>
+        <a:font script="Knda" typeface="Tunga"/>
+        <a:font script="Guru" typeface="Raavi"/>
+        <a:font script="Cans" typeface="Euphemia"/>
+        <a:font script="Cher" typeface="Plantagenet Cherokee"/>
+        <a:font script="Yiii" typeface="Microsoft Yi Baiti"/>
+        <a:font script="Tibt" typeface="Microsoft Himalaya"/>
+        <a:font script="Thaa" typeface="MV Boli"/>
+        <a:font script="Deva" typeface="Mangal"/>
+        <a:font script="Telu" typeface="Gautami"/>
+        <a:font script="Taml" typeface="Latha"/>
+        <a:font script="Syrc" typeface="Estrangelo Edessa"/>
+        <a:font script="Orya" typeface="Kalinga"/>
+        <a:font script="Mlym" typeface="Kartika"/>
+        <a:font script="Laoo" typeface="DokChampa"/>
+        <a:font script="Sinh" typeface="Iskoola Pota"/>
+        <a:font script="Mong" typeface="Mongolian Baiti"/>
+        <a:font script="Viet" typeface="Tahoma"/>
         <a:font script="Uigh" typeface="Microsoft Uighur"/>
         <a:font script="Geor" typeface="Sylfaen"/>
       </a:minorFont>
     </a:fontScheme>
-    <a:fmtScheme name="Office">
+    <a:fmtScheme name="Parcel">
       <a:fillStyleLst>
         <a:solidFill>
           <a:schemeClr val="phClr"/>
@@ -5782,62 +5947,62 @@
           <a:gsLst>
             <a:gs pos="0">
               <a:schemeClr val="phClr">
-                <a:tint val="50000"/>
-                <a:satMod val="300000"/>
-              </a:schemeClr>
-            </a:gs>
-            <a:gs pos="35000">
-              <a:schemeClr val="phClr">
-                <a:tint val="37000"/>
-                <a:satMod val="300000"/>
+                <a:tint val="80000"/>
+                <a:satMod val="107000"/>
+                <a:lumMod val="103000"/>
               </a:schemeClr>
             </a:gs>
             <a:gs pos="100000">
               <a:schemeClr val="phClr">
-                <a:tint val="15000"/>
-                <a:satMod val="350000"/>
+                <a:tint val="82000"/>
+                <a:satMod val="109000"/>
+                <a:lumMod val="103000"/>
               </a:schemeClr>
             </a:gs>
           </a:gsLst>
-          <a:lin ang="16200000" scaled="1"/>
+          <a:lin ang="5400000" scaled="0"/>
         </a:gradFill>
         <a:gradFill rotWithShape="1">
           <a:gsLst>
             <a:gs pos="0">
               <a:schemeClr val="phClr">
-                <a:tint val="100000"/>
+                <a:tint val="97000"/>
+                <a:satMod val="100000"/>
+                <a:lumMod val="102000"/>
+              </a:schemeClr>
+            </a:gs>
+            <a:gs pos="50000">
+              <a:schemeClr val="phClr">
                 <a:shade val="100000"/>
-                <a:satMod val="130000"/>
+                <a:satMod val="103000"/>
+                <a:lumMod val="100000"/>
               </a:schemeClr>
             </a:gs>
             <a:gs pos="100000">
               <a:schemeClr val="phClr">
-                <a:tint val="50000"/>
-                <a:shade val="100000"/>
-                <a:satMod val="350000"/>
+                <a:shade val="93000"/>
+                <a:satMod val="110000"/>
+                <a:lumMod val="99000"/>
               </a:schemeClr>
             </a:gs>
           </a:gsLst>
-          <a:lin ang="16200000" scaled="0"/>
+          <a:lin ang="5400000" scaled="0"/>
         </a:gradFill>
       </a:fillStyleLst>
       <a:lnStyleLst>
-        <a:ln w="9525" cap="flat" cmpd="sng" algn="ctr">
-          <a:solidFill>
-            <a:schemeClr val="phClr">
-              <a:shade val="95000"/>
-              <a:satMod val="105000"/>
-            </a:schemeClr>
-          </a:solidFill>
-          <a:prstDash val="solid"/>
-        </a:ln>
-        <a:ln w="25400" cap="flat" cmpd="sng" algn="ctr">
+        <a:ln w="6350" cap="flat" cmpd="sng" algn="ctr">
           <a:solidFill>
             <a:schemeClr val="phClr"/>
           </a:solidFill>
           <a:prstDash val="solid"/>
         </a:ln>
-        <a:ln w="38100" cap="flat" cmpd="sng" algn="ctr">
+        <a:ln w="12700" cap="flat" cmpd="sng" algn="ctr">
+          <a:solidFill>
+            <a:schemeClr val="phClr"/>
+          </a:solidFill>
+          <a:prstDash val="solid"/>
+        </a:ln>
+        <a:ln w="31750" cap="flat" cmpd="sng" algn="ctr">
           <a:solidFill>
             <a:schemeClr val="phClr"/>
           </a:solidFill>
@@ -5846,28 +6011,16 @@
       </a:lnStyleLst>
       <a:effectStyleLst>
         <a:effectStyle>
-          <a:effectLst>
-            <a:outerShdw blurRad="40000" dist="20000" dir="5400000" rotWithShape="0">
-              <a:srgbClr val="000000">
-                <a:alpha val="38000"/>
-              </a:srgbClr>
-            </a:outerShdw>
-          </a:effectLst>
+          <a:effectLst/>
+        </a:effectStyle>
+        <a:effectStyle>
+          <a:effectLst/>
         </a:effectStyle>
         <a:effectStyle>
           <a:effectLst>
-            <a:outerShdw blurRad="40000" dist="23000" dir="5400000" rotWithShape="0">
+            <a:outerShdw blurRad="55880" dist="15240" dir="5400000" algn="ctr" rotWithShape="0">
               <a:srgbClr val="000000">
-                <a:alpha val="35000"/>
-              </a:srgbClr>
-            </a:outerShdw>
-          </a:effectLst>
-        </a:effectStyle>
-        <a:effectStyle>
-          <a:effectLst>
-            <a:outerShdw blurRad="40000" dist="23000" dir="5400000" rotWithShape="0">
-              <a:srgbClr val="000000">
-                <a:alpha val="35000"/>
+                <a:alpha val="45000"/>
               </a:srgbClr>
             </a:outerShdw>
           </a:effectLst>
@@ -5875,12 +6028,10 @@
             <a:camera prst="orthographicFront">
               <a:rot lat="0" lon="0" rev="0"/>
             </a:camera>
-            <a:lightRig rig="threePt" dir="t">
-              <a:rot lat="0" lon="0" rev="1200000"/>
-            </a:lightRig>
+            <a:lightRig rig="brightRoom" dir="tl"/>
           </a:scene3d>
-          <a:sp3d>
-            <a:bevelT w="63500" h="25400"/>
+          <a:sp3d prstMaterial="dkEdge">
+            <a:bevelT w="0" h="0"/>
           </a:sp3d>
         </a:effectStyle>
       </a:effectStyleLst>
@@ -5888,95 +6039,45 @@
         <a:solidFill>
           <a:schemeClr val="phClr"/>
         </a:solidFill>
+        <a:solidFill>
+          <a:schemeClr val="phClr">
+            <a:tint val="95000"/>
+            <a:satMod val="170000"/>
+          </a:schemeClr>
+        </a:solidFill>
         <a:gradFill rotWithShape="1">
           <a:gsLst>
             <a:gs pos="0">
               <a:schemeClr val="phClr">
-                <a:tint val="40000"/>
-                <a:satMod val="350000"/>
-              </a:schemeClr>
-            </a:gs>
-            <a:gs pos="40000">
-              <a:schemeClr val="phClr">
-                <a:tint val="45000"/>
-                <a:shade val="99000"/>
-                <a:satMod val="350000"/>
+                <a:tint val="97000"/>
+                <a:shade val="100000"/>
+                <a:satMod val="185000"/>
+                <a:lumMod val="120000"/>
               </a:schemeClr>
             </a:gs>
             <a:gs pos="100000">
               <a:schemeClr val="phClr">
-                <a:shade val="20000"/>
-                <a:satMod val="255000"/>
+                <a:tint val="96000"/>
+                <a:shade val="95000"/>
+                <a:satMod val="215000"/>
+                <a:lumMod val="80000"/>
               </a:schemeClr>
             </a:gs>
           </a:gsLst>
           <a:path path="circle">
-            <a:fillToRect l="50000" t="-80000" r="50000" b="180000"/>
-          </a:path>
-        </a:gradFill>
-        <a:gradFill rotWithShape="1">
-          <a:gsLst>
-            <a:gs pos="0">
-              <a:schemeClr val="phClr">
-                <a:tint val="80000"/>
-                <a:satMod val="300000"/>
-              </a:schemeClr>
-            </a:gs>
-            <a:gs pos="100000">
-              <a:schemeClr val="phClr">
-                <a:shade val="30000"/>
-                <a:satMod val="200000"/>
-              </a:schemeClr>
-            </a:gs>
-          </a:gsLst>
-          <a:path path="circle">
-            <a:fillToRect l="50000" t="50000" r="50000" b="50000"/>
+            <a:fillToRect l="50000" t="55000" r="125000" b="100000"/>
           </a:path>
         </a:gradFill>
       </a:bgFillStyleLst>
     </a:fmtScheme>
   </a:themeElements>
-  <a:objectDefaults>
-    <a:spDef>
-      <a:spPr/>
-      <a:bodyPr/>
-      <a:lstStyle/>
-      <a:style>
-        <a:lnRef idx="1">
-          <a:schemeClr val="accent1"/>
-        </a:lnRef>
-        <a:fillRef idx="3">
-          <a:schemeClr val="accent1"/>
-        </a:fillRef>
-        <a:effectRef idx="2">
-          <a:schemeClr val="accent1"/>
-        </a:effectRef>
-        <a:fontRef idx="minor">
-          <a:schemeClr val="lt1"/>
-        </a:fontRef>
-      </a:style>
-    </a:spDef>
-    <a:lnDef>
-      <a:spPr/>
-      <a:bodyPr/>
-      <a:lstStyle/>
-      <a:style>
-        <a:lnRef idx="2">
-          <a:schemeClr val="accent1"/>
-        </a:lnRef>
-        <a:fillRef idx="0">
-          <a:schemeClr val="accent1"/>
-        </a:fillRef>
-        <a:effectRef idx="1">
-          <a:schemeClr val="accent1"/>
-        </a:effectRef>
-        <a:fontRef idx="minor">
-          <a:schemeClr val="tx1"/>
-        </a:fontRef>
-      </a:style>
-    </a:lnDef>
-  </a:objectDefaults>
+  <a:objectDefaults/>
   <a:extraClrSchemeLst/>
+  <a:extLst>
+    <a:ext uri="{05A4C25C-085E-4340-85A3-A5531E510DB2}">
+      <thm15:themeFamily xmlns:thm15="http://schemas.microsoft.com/office/thememl/2012/main" name="Parcel" id="{8BEC4385-4EB9-4D53-BFB5-0EA123736B6D}" vid="{4DB32801-28C0-48B0-8C1D-A9A58613615A}"/>
+    </a:ext>
+  </a:extLst>
 </a:theme>
 </file>
 

</xml_diff>